<commit_message>
Updating paths in katas
</commit_message>
<xml_diff>
--- a/workshops/git-github-deep-dive/git_github_deep_dive.pptx
+++ b/workshops/git-github-deep-dive/git_github_deep_dive.pptx
@@ -20541,16 +20541,86 @@
             </a:pPr>
             <a:r>
               <a:rPr lang="en-US" sz="2100" dirty="0"/>
-              <a:t>Git </a:t>
-            </a:r>
-            <a:r>
-              <a:rPr lang="en-US" sz="2100" dirty="0" err="1"/>
+              <a:t>Create a new Git repository: </a:t>
+            </a:r>
+            <a:r>
+              <a:rPr lang="en-US" sz="2100" dirty="0">
+                <a:solidFill>
+                  <a:srgbClr val="002060"/>
+                </a:solidFill>
+              </a:rPr>
+              <a:t>git </a:t>
+            </a:r>
+            <a:r>
+              <a:rPr lang="en-US" sz="2100" dirty="0" err="1">
+                <a:solidFill>
+                  <a:srgbClr val="002060"/>
+                </a:solidFill>
+              </a:rPr>
               <a:t>init</a:t>
             </a:r>
             <a:r>
+              <a:rPr lang="en-US" sz="2100" dirty="0">
+                <a:solidFill>
+                  <a:srgbClr val="002060"/>
+                </a:solidFill>
+              </a:rPr>
+              <a:t> [directory]</a:t>
+            </a:r>
+          </a:p>
+          <a:p>
+            <a:pPr marL="342900" indent="-342900">
+              <a:buFont typeface="Arial" panose="020B0604020202020204" pitchFamily="34" charset="0"/>
+              <a:buChar char="•"/>
+            </a:pPr>
+            <a:endParaRPr lang="en-US" sz="2100" dirty="0">
+              <a:solidFill>
+                <a:srgbClr val="002060"/>
+              </a:solidFill>
+            </a:endParaRPr>
+          </a:p>
+          <a:p>
+            <a:pPr marL="342900" indent="-342900">
+              <a:buFont typeface="Arial" panose="020B0604020202020204" pitchFamily="34" charset="0"/>
+              <a:buChar char="•"/>
+            </a:pPr>
+            <a:r>
               <a:rPr lang="en-US" sz="2100" dirty="0"/>
-              <a:t>  + clone</a:t>
-            </a:r>
+              <a:t>Clone an existing repository (local or remote): </a:t>
+            </a:r>
+            <a:r>
+              <a:rPr lang="en-US" sz="2100" dirty="0">
+                <a:solidFill>
+                  <a:srgbClr val="002060"/>
+                </a:solidFill>
+              </a:rPr>
+              <a:t>git clone [folder / URL] [folder]</a:t>
+            </a:r>
+          </a:p>
+          <a:p>
+            <a:pPr marL="342900" indent="-342900">
+              <a:buFont typeface="Arial" panose="020B0604020202020204" pitchFamily="34" charset="0"/>
+              <a:buChar char="•"/>
+            </a:pPr>
+            <a:endParaRPr lang="en-US" sz="2100" dirty="0">
+              <a:solidFill>
+                <a:srgbClr val="002060"/>
+              </a:solidFill>
+            </a:endParaRPr>
+          </a:p>
+          <a:p>
+            <a:pPr marL="342900" indent="-342900">
+              <a:buFont typeface="Arial" panose="020B0604020202020204" pitchFamily="34" charset="0"/>
+              <a:buChar char="•"/>
+            </a:pPr>
+            <a:endParaRPr lang="en-US" sz="2100" dirty="0"/>
+          </a:p>
+          <a:p>
+            <a:pPr marL="800100" lvl="1" indent="-342900">
+              <a:buFont typeface="Arial" panose="020B0604020202020204" pitchFamily="34" charset="0"/>
+              <a:buChar char="•"/>
+            </a:pPr>
+            <a:endParaRPr lang="en-US" sz="2100" dirty="0"/>
           </a:p>
         </p:txBody>
       </p:sp>
@@ -27326,30 +27396,6 @@
             <a:endParaRPr lang="da-DK" sz="2100" dirty="0"/>
           </a:p>
           <a:p>
-            <a:pPr marL="342900" indent="-342900">
-              <a:buFont typeface="Arial" panose="020B0604020202020204" pitchFamily="34" charset="0"/>
-              <a:buChar char="•"/>
-            </a:pPr>
-            <a:endParaRPr lang="da-DK" sz="2100" dirty="0"/>
-          </a:p>
-          <a:p>
-            <a:pPr marL="342900" indent="-342900">
-              <a:buFont typeface="Arial" panose="020B0604020202020204" pitchFamily="34" charset="0"/>
-              <a:buChar char="•"/>
-            </a:pPr>
-            <a:r>
-              <a:rPr lang="da-DK" sz="2100" dirty="0">
-                <a:hlinkClick r:id="rId8"/>
-              </a:rPr>
-              <a:t>https://git-scm.com/downloads/guis</a:t>
-            </a:r>
-            <a:endParaRPr lang="da-DK" sz="2100" dirty="0"/>
-          </a:p>
-          <a:p>
-            <a:pPr marL="342900" indent="-342900">
-              <a:buFont typeface="Arial" panose="020B0604020202020204" pitchFamily="34" charset="0"/>
-              <a:buChar char="•"/>
-            </a:pPr>
             <a:endParaRPr lang="da-DK" sz="2100" dirty="0"/>
           </a:p>
         </p:txBody>
@@ -30792,18 +30838,18 @@
 </file>
 
 <file path=customXml/item1.xml><?xml version="1.0" encoding="utf-8"?>
-<p:properties xmlns:p="http://schemas.microsoft.com/office/2006/metadata/properties" xmlns:xsi="http://www.w3.org/2001/XMLSchema-instance" xmlns:pc="http://schemas.microsoft.com/office/infopath/2007/PartnerControls">
-  <documentManagement/>
-</p:properties>
-</file>
-
-<file path=customXml/item2.xml><?xml version="1.0" encoding="utf-8"?>
 <?mso-contentType ?>
 <FormTemplates xmlns="http://schemas.microsoft.com/sharepoint/v3/contenttype/forms">
   <Display>DocumentLibraryForm</Display>
   <Edit>DocumentLibraryForm</Edit>
   <New>DocumentLibraryForm</New>
 </FormTemplates>
+</file>
+
+<file path=customXml/item2.xml><?xml version="1.0" encoding="utf-8"?>
+<p:properties xmlns:p="http://schemas.microsoft.com/office/2006/metadata/properties" xmlns:xsi="http://www.w3.org/2001/XMLSchema-instance" xmlns:pc="http://schemas.microsoft.com/office/infopath/2007/PartnerControls">
+  <documentManagement/>
+</p:properties>
 </file>
 
 <file path=customXml/item3.xml><?xml version="1.0" encoding="utf-8"?>
@@ -30992,18 +31038,18 @@
 </file>
 
 <file path=customXml/itemProps1.xml><?xml version="1.0" encoding="utf-8"?>
-<ds:datastoreItem xmlns:ds="http://schemas.openxmlformats.org/officeDocument/2006/customXml" ds:itemID="{B61EE2CA-DCC7-45E5-87C8-6789A166AF77}">
+<ds:datastoreItem xmlns:ds="http://schemas.openxmlformats.org/officeDocument/2006/customXml" ds:itemID="{4273EE10-C1B2-449B-9085-39965BA21A56}">
   <ds:schemaRefs>
-    <ds:schemaRef ds:uri="http://schemas.microsoft.com/office/2006/metadata/properties"/>
-    <ds:schemaRef ds:uri="http://schemas.microsoft.com/office/infopath/2007/PartnerControls"/>
+    <ds:schemaRef ds:uri="http://schemas.microsoft.com/sharepoint/v3/contenttype/forms"/>
   </ds:schemaRefs>
 </ds:datastoreItem>
 </file>
 
 <file path=customXml/itemProps2.xml><?xml version="1.0" encoding="utf-8"?>
-<ds:datastoreItem xmlns:ds="http://schemas.openxmlformats.org/officeDocument/2006/customXml" ds:itemID="{4273EE10-C1B2-449B-9085-39965BA21A56}">
+<ds:datastoreItem xmlns:ds="http://schemas.openxmlformats.org/officeDocument/2006/customXml" ds:itemID="{B61EE2CA-DCC7-45E5-87C8-6789A166AF77}">
   <ds:schemaRefs>
-    <ds:schemaRef ds:uri="http://schemas.microsoft.com/sharepoint/v3/contenttype/forms"/>
+    <ds:schemaRef ds:uri="http://schemas.microsoft.com/office/2006/metadata/properties"/>
+    <ds:schemaRef ds:uri="http://schemas.microsoft.com/office/infopath/2007/PartnerControls"/>
   </ds:schemaRefs>
 </ds:datastoreItem>
 </file>

</xml_diff>

<commit_message>
=added url to sample code refs for remaining katas
</commit_message>
<xml_diff>
--- a/workshops/git-github-deep-dive/git_github_deep_dive.pptx
+++ b/workshops/git-github-deep-dive/git_github_deep_dive.pptx
@@ -3645,18 +3645,8 @@
             </a:pPr>
             <a:r>
               <a:rPr lang="en-US" sz="1200" dirty="0"/>
-              <a:t>merge (conflict resolution – how to map it to your IDE, </a:t>
-            </a:r>
-            <a:r>
-              <a:rPr lang="en-US" sz="1200" dirty="0" err="1"/>
-              <a:t>etc</a:t>
-            </a:r>
-            <a:r>
-              <a:rPr lang="en-US" sz="1200" dirty="0"/>
-              <a:t>)</a:t>
-            </a:r>
-          </a:p>
-          <a:p>
+              <a:t>https://git-scm.com/book/en/v2/Git-Branching-Basic-Branching-and-Merging</a:t>
+            </a:r>
             <a:endParaRPr lang="da-DK" dirty="0"/>
           </a:p>
         </p:txBody>
@@ -3829,7 +3819,7 @@
           <a:p>
             <a:r>
               <a:rPr lang="en-US" dirty="0"/>
-              <a:t>Theme: Change some files, commit them, regret commit, remove certain files, recommit.</a:t>
+              <a:t>https://www.git-tower.com/learn/git/commands/git-commit/</a:t>
             </a:r>
             <a:endParaRPr lang="da-DK" dirty="0"/>
           </a:p>
@@ -4002,8 +3992,8 @@
           <a:lstStyle/>
           <a:p>
             <a:r>
-              <a:rPr lang="en-US"/>
-              <a:t>Theme: Rebasing</a:t>
+              <a:rPr lang="en-US" dirty="0"/>
+              <a:t>https://www.benmarshall.me/git-rebase/</a:t>
             </a:r>
             <a:endParaRPr lang="da-DK" dirty="0"/>
           </a:p>
@@ -4092,7 +4082,7 @@
           <a:p>
             <a:r>
               <a:rPr lang="en-US" dirty="0"/>
-              <a:t>Theme: Push local to remote. Merge from remote.</a:t>
+              <a:t>https://git-scm.com/book/en/v2/Git-Basics-Working-with-Remotes</a:t>
             </a:r>
             <a:endParaRPr lang="da-DK" dirty="0"/>
           </a:p>
@@ -5070,7 +5060,7 @@
           <a:p>
             <a:r>
               <a:rPr lang="en-US" dirty="0"/>
-              <a:t>Theme: Stuff with files</a:t>
+              <a:t>https://docs.github.com/en/free-pro-team@latest/github/managing-files-in-a-repository</a:t>
             </a:r>
             <a:endParaRPr lang="da-DK" dirty="0"/>
           </a:p>
@@ -34395,18 +34385,18 @@
 </file>
 
 <file path=customXml/item1.xml><?xml version="1.0" encoding="utf-8"?>
+<p:properties xmlns:p="http://schemas.microsoft.com/office/2006/metadata/properties" xmlns:xsi="http://www.w3.org/2001/XMLSchema-instance" xmlns:pc="http://schemas.microsoft.com/office/infopath/2007/PartnerControls">
+  <documentManagement/>
+</p:properties>
+</file>
+
+<file path=customXml/item2.xml><?xml version="1.0" encoding="utf-8"?>
 <?mso-contentType ?>
 <FormTemplates xmlns="http://schemas.microsoft.com/sharepoint/v3/contenttype/forms">
   <Display>DocumentLibraryForm</Display>
   <Edit>DocumentLibraryForm</Edit>
   <New>DocumentLibraryForm</New>
 </FormTemplates>
-</file>
-
-<file path=customXml/item2.xml><?xml version="1.0" encoding="utf-8"?>
-<p:properties xmlns:p="http://schemas.microsoft.com/office/2006/metadata/properties" xmlns:xsi="http://www.w3.org/2001/XMLSchema-instance" xmlns:pc="http://schemas.microsoft.com/office/infopath/2007/PartnerControls">
-  <documentManagement/>
-</p:properties>
 </file>
 
 <file path=customXml/item3.xml><?xml version="1.0" encoding="utf-8"?>
@@ -34595,18 +34585,18 @@
 </file>
 
 <file path=customXml/itemProps1.xml><?xml version="1.0" encoding="utf-8"?>
-<ds:datastoreItem xmlns:ds="http://schemas.openxmlformats.org/officeDocument/2006/customXml" ds:itemID="{4273EE10-C1B2-449B-9085-39965BA21A56}">
+<ds:datastoreItem xmlns:ds="http://schemas.openxmlformats.org/officeDocument/2006/customXml" ds:itemID="{B61EE2CA-DCC7-45E5-87C8-6789A166AF77}">
   <ds:schemaRefs>
-    <ds:schemaRef ds:uri="http://schemas.microsoft.com/sharepoint/v3/contenttype/forms"/>
+    <ds:schemaRef ds:uri="http://schemas.microsoft.com/office/2006/metadata/properties"/>
+    <ds:schemaRef ds:uri="http://schemas.microsoft.com/office/infopath/2007/PartnerControls"/>
   </ds:schemaRefs>
 </ds:datastoreItem>
 </file>
 
 <file path=customXml/itemProps2.xml><?xml version="1.0" encoding="utf-8"?>
-<ds:datastoreItem xmlns:ds="http://schemas.openxmlformats.org/officeDocument/2006/customXml" ds:itemID="{B61EE2CA-DCC7-45E5-87C8-6789A166AF77}">
+<ds:datastoreItem xmlns:ds="http://schemas.openxmlformats.org/officeDocument/2006/customXml" ds:itemID="{4273EE10-C1B2-449B-9085-39965BA21A56}">
   <ds:schemaRefs>
-    <ds:schemaRef ds:uri="http://schemas.microsoft.com/office/2006/metadata/properties"/>
-    <ds:schemaRef ds:uri="http://schemas.microsoft.com/office/infopath/2007/PartnerControls"/>
+    <ds:schemaRef ds:uri="http://schemas.microsoft.com/sharepoint/v3/contenttype/forms"/>
   </ds:schemaRefs>
 </ds:datastoreItem>
 </file>

</xml_diff>

<commit_message>
=added a SSH section based on input from Rasmus
</commit_message>
<xml_diff>
--- a/workshops/git-github-deep-dive/git_github_deep_dive.pptx
+++ b/workshops/git-github-deep-dive/git_github_deep_dive.pptx
@@ -5,10 +5,10 @@
     <p:sldMasterId id="2147483648" r:id="rId4"/>
   </p:sldMasterIdLst>
   <p:notesMasterIdLst>
-    <p:notesMasterId r:id="rId40"/>
+    <p:notesMasterId r:id="rId41"/>
   </p:notesMasterIdLst>
   <p:handoutMasterIdLst>
-    <p:handoutMasterId r:id="rId41"/>
+    <p:handoutMasterId r:id="rId42"/>
   </p:handoutMasterIdLst>
   <p:sldIdLst>
     <p:sldId id="372" r:id="rId5"/>
@@ -38,38 +38,39 @@
     <p:sldId id="464" r:id="rId29"/>
     <p:sldId id="499" r:id="rId30"/>
     <p:sldId id="501" r:id="rId31"/>
-    <p:sldId id="502" r:id="rId32"/>
-    <p:sldId id="503" r:id="rId33"/>
-    <p:sldId id="504" r:id="rId34"/>
-    <p:sldId id="477" r:id="rId35"/>
-    <p:sldId id="478" r:id="rId36"/>
-    <p:sldId id="500" r:id="rId37"/>
-    <p:sldId id="479" r:id="rId38"/>
-    <p:sldId id="476" r:id="rId39"/>
+    <p:sldId id="505" r:id="rId32"/>
+    <p:sldId id="502" r:id="rId33"/>
+    <p:sldId id="503" r:id="rId34"/>
+    <p:sldId id="504" r:id="rId35"/>
+    <p:sldId id="477" r:id="rId36"/>
+    <p:sldId id="478" r:id="rId37"/>
+    <p:sldId id="500" r:id="rId38"/>
+    <p:sldId id="479" r:id="rId39"/>
+    <p:sldId id="476" r:id="rId40"/>
   </p:sldIdLst>
   <p:sldSz cx="12192000" cy="6858000"/>
   <p:notesSz cx="6858000" cy="9144000"/>
   <p:embeddedFontLst>
     <p:embeddedFont>
       <p:font typeface="Calibri" panose="020F0502020204030204" pitchFamily="34" charset="0"/>
-      <p:regular r:id="rId42"/>
-      <p:bold r:id="rId43"/>
-      <p:italic r:id="rId44"/>
-      <p:boldItalic r:id="rId45"/>
+      <p:regular r:id="rId43"/>
+      <p:bold r:id="rId44"/>
+      <p:italic r:id="rId45"/>
+      <p:boldItalic r:id="rId46"/>
     </p:embeddedFont>
     <p:embeddedFont>
       <p:font typeface="DFDS" panose="020B0604020202020204" charset="0"/>
-      <p:regular r:id="rId46"/>
-      <p:bold r:id="rId47"/>
-      <p:italic r:id="rId48"/>
+      <p:regular r:id="rId47"/>
+      <p:bold r:id="rId48"/>
+      <p:italic r:id="rId49"/>
     </p:embeddedFont>
     <p:embeddedFont>
       <p:font typeface="DFDS Bold" panose="020B0604020202020204" charset="0"/>
-      <p:bold r:id="rId49"/>
+      <p:bold r:id="rId50"/>
     </p:embeddedFont>
     <p:embeddedFont>
       <p:font typeface="DFDS Light" panose="020B0604020202020204" charset="0"/>
-      <p:regular r:id="rId50"/>
+      <p:regular r:id="rId51"/>
     </p:embeddedFont>
   </p:embeddedFontLst>
   <p:defaultTextStyle>
@@ -4342,11 +4343,7 @@
           <a:bodyPr/>
           <a:lstStyle/>
           <a:p>
-            <a:r>
-              <a:rPr lang="en-US" dirty="0"/>
-              <a:t>https://medium.com/@urna.hybesis/pull-request-workflow-with-git-6-steps-guide-3858e30b5fa4</a:t>
-            </a:r>
-            <a:endParaRPr lang="da-DK" dirty="0"/>
+            <a:endParaRPr lang="da-DK" b="0" dirty="0"/>
           </a:p>
         </p:txBody>
       </p:sp>
@@ -4377,7 +4374,7 @@
     </p:spTree>
     <p:extLst>
       <p:ext uri="{BB962C8B-B14F-4D97-AF65-F5344CB8AC3E}">
-        <p14:creationId xmlns:p14="http://schemas.microsoft.com/office/powerpoint/2010/main" val="3238035336"/>
+        <p14:creationId xmlns:p14="http://schemas.microsoft.com/office/powerpoint/2010/main" val="1788361971"/>
       </p:ext>
     </p:extLst>
   </p:cSld>
@@ -4563,7 +4560,28 @@
           <a:bodyPr/>
           <a:lstStyle/>
           <a:p>
-            <a:endParaRPr lang="da-DK" b="0" dirty="0"/>
+            <a:pPr marL="0" marR="0" lvl="0" indent="0" algn="l" defTabSz="914400" rtl="0" eaLnBrk="1" fontAlgn="auto" latinLnBrk="0" hangingPunct="1">
+              <a:lnSpc>
+                <a:spcPct val="100000"/>
+              </a:lnSpc>
+              <a:spcBef>
+                <a:spcPts val="0"/>
+              </a:spcBef>
+              <a:spcAft>
+                <a:spcPts val="0"/>
+              </a:spcAft>
+              <a:buClrTx/>
+              <a:buSzTx/>
+              <a:buFontTx/>
+              <a:buNone/>
+              <a:tabLst/>
+              <a:defRPr/>
+            </a:pPr>
+            <a:r>
+              <a:rPr lang="en-US" dirty="0"/>
+              <a:t>Step 1 =&gt; https://github.com/pulls</a:t>
+            </a:r>
+            <a:endParaRPr lang="da-DK" dirty="0"/>
           </a:p>
         </p:txBody>
       </p:sp>
@@ -4594,7 +4612,7 @@
     </p:spTree>
     <p:extLst>
       <p:ext uri="{BB962C8B-B14F-4D97-AF65-F5344CB8AC3E}">
-        <p14:creationId xmlns:p14="http://schemas.microsoft.com/office/powerpoint/2010/main" val="1075762800"/>
+        <p14:creationId xmlns:p14="http://schemas.microsoft.com/office/powerpoint/2010/main" val="3238035336"/>
       </p:ext>
     </p:extLst>
   </p:cSld>
@@ -4648,13 +4666,7 @@
           <a:bodyPr/>
           <a:lstStyle/>
           <a:p>
-            <a:r>
-              <a:rPr lang="en-US" dirty="0"/>
-              <a:t>Add a SSH key to your account (https://www.inmotionhosting.com/support/website/ssh/how-to-add-ssh-keys-to-your-github-account/) </a:t>
-            </a:r>
-          </a:p>
-          <a:p>
-            <a:endParaRPr lang="da-DK" dirty="0"/>
+            <a:endParaRPr lang="da-DK" b="0" dirty="0"/>
           </a:p>
         </p:txBody>
       </p:sp>
@@ -4677,6 +4689,132 @@
               <a:rPr lang="en-GB" smtClean="0"/>
               <a:pPr/>
               <a:t>30</a:t>
+            </a:fld>
+            <a:endParaRPr lang="en-GB" dirty="0"/>
+          </a:p>
+        </p:txBody>
+      </p:sp>
+    </p:spTree>
+    <p:extLst>
+      <p:ext uri="{BB962C8B-B14F-4D97-AF65-F5344CB8AC3E}">
+        <p14:creationId xmlns:p14="http://schemas.microsoft.com/office/powerpoint/2010/main" val="1075762800"/>
+      </p:ext>
+    </p:extLst>
+  </p:cSld>
+  <p:clrMapOvr>
+    <a:masterClrMapping/>
+  </p:clrMapOvr>
+</p:notes>
+</file>
+
+<file path=ppt/notesSlides/notesSlide22.xml><?xml version="1.0" encoding="utf-8"?>
+<p:notes xmlns:a="http://schemas.openxmlformats.org/drawingml/2006/main" xmlns:r="http://schemas.openxmlformats.org/officeDocument/2006/relationships" xmlns:p="http://schemas.openxmlformats.org/presentationml/2006/main">
+  <p:cSld>
+    <p:spTree>
+      <p:nvGrpSpPr>
+        <p:cNvPr id="1" name=""/>
+        <p:cNvGrpSpPr/>
+        <p:nvPr/>
+      </p:nvGrpSpPr>
+      <p:grpSpPr>
+        <a:xfrm>
+          <a:off x="0" y="0"/>
+          <a:ext cx="0" cy="0"/>
+          <a:chOff x="0" y="0"/>
+          <a:chExt cx="0" cy="0"/>
+        </a:xfrm>
+      </p:grpSpPr>
+      <p:sp>
+        <p:nvSpPr>
+          <p:cNvPr id="2" name="Slide Image Placeholder 1"/>
+          <p:cNvSpPr>
+            <a:spLocks noGrp="1" noRot="1" noChangeAspect="1"/>
+          </p:cNvSpPr>
+          <p:nvPr>
+            <p:ph type="sldImg"/>
+          </p:nvPr>
+        </p:nvSpPr>
+        <p:spPr/>
+      </p:sp>
+      <p:sp>
+        <p:nvSpPr>
+          <p:cNvPr id="3" name="Notes Placeholder 2"/>
+          <p:cNvSpPr>
+            <a:spLocks noGrp="1"/>
+          </p:cNvSpPr>
+          <p:nvPr>
+            <p:ph type="body" idx="1"/>
+          </p:nvPr>
+        </p:nvSpPr>
+        <p:spPr/>
+        <p:txBody>
+          <a:bodyPr/>
+          <a:lstStyle/>
+          <a:p>
+            <a:pPr marL="0" marR="0" lvl="0" indent="0" algn="l" defTabSz="914400" rtl="0" eaLnBrk="1" fontAlgn="auto" latinLnBrk="0" hangingPunct="1">
+              <a:lnSpc>
+                <a:spcPct val="100000"/>
+              </a:lnSpc>
+              <a:spcBef>
+                <a:spcPts val="0"/>
+              </a:spcBef>
+              <a:spcAft>
+                <a:spcPts val="0"/>
+              </a:spcAft>
+              <a:buClrTx/>
+              <a:buSzTx/>
+              <a:buFontTx/>
+              <a:buNone/>
+              <a:tabLst/>
+              <a:defRPr/>
+            </a:pPr>
+            <a:r>
+              <a:rPr lang="da-DK" dirty="0"/>
+              <a:t>Step 1 =&gt; </a:t>
+            </a:r>
+            <a:r>
+              <a:rPr lang="da-DK" sz="1200" kern="1200" dirty="0">
+                <a:solidFill>
+                  <a:schemeClr val="tx1"/>
+                </a:solidFill>
+                <a:latin typeface="Arial" panose="020B0604020202020204" pitchFamily="34" charset="0"/>
+                <a:ea typeface="+mn-ea"/>
+                <a:cs typeface="+mn-cs"/>
+              </a:rPr>
+              <a:t>ssh-keygen -b 4096 </a:t>
+            </a:r>
+          </a:p>
+          <a:p>
+            <a:endParaRPr lang="en-US" dirty="0"/>
+          </a:p>
+          <a:p>
+            <a:r>
+              <a:rPr lang="en-US" dirty="0"/>
+              <a:t>Step 2 =&gt; https://github.com/settings/keys</a:t>
+            </a:r>
+            <a:endParaRPr lang="da-DK" dirty="0"/>
+          </a:p>
+        </p:txBody>
+      </p:sp>
+      <p:sp>
+        <p:nvSpPr>
+          <p:cNvPr id="4" name="Slide Number Placeholder 3"/>
+          <p:cNvSpPr>
+            <a:spLocks noGrp="1"/>
+          </p:cNvSpPr>
+          <p:nvPr>
+            <p:ph type="sldNum" sz="quarter" idx="5"/>
+          </p:nvPr>
+        </p:nvSpPr>
+        <p:spPr/>
+        <p:txBody>
+          <a:bodyPr/>
+          <a:lstStyle/>
+          <a:p>
+            <a:fld id="{49436F85-577F-4A92-A47F-D540A2BCC821}" type="slidenum">
+              <a:rPr lang="en-GB" smtClean="0"/>
+              <a:pPr/>
+              <a:t>31</a:t>
             </a:fld>
             <a:endParaRPr lang="en-GB" dirty="0"/>
           </a:p>
@@ -22775,37 +22913,6 @@
                                         <p:tgtEl>
                                           <p:spTgt spid="13">
                                             <p:txEl>
-                                              <p:pRg st="2" end="2"/>
-                                            </p:txEl>
-                                          </p:spTgt>
-                                        </p:tgtEl>
-                                        <p:attrNameLst>
-                                          <p:attrName>style.visibility</p:attrName>
-                                        </p:attrNameLst>
-                                      </p:cBhvr>
-                                      <p:to>
-                                        <p:strVal val="visible"/>
-                                      </p:to>
-                                    </p:set>
-                                  </p:childTnLst>
-                                </p:cTn>
-                              </p:par>
-                              <p:par>
-                                <p:cTn id="7" presetID="1" presetClass="entr" presetSubtype="0" fill="hold" nodeType="withEffect">
-                                  <p:stCondLst>
-                                    <p:cond delay="0"/>
-                                  </p:stCondLst>
-                                  <p:childTnLst>
-                                    <p:set>
-                                      <p:cBhvr>
-                                        <p:cTn id="8" dur="1" fill="hold">
-                                          <p:stCondLst>
-                                            <p:cond delay="0"/>
-                                          </p:stCondLst>
-                                        </p:cTn>
-                                        <p:tgtEl>
-                                          <p:spTgt spid="13">
-                                            <p:txEl>
                                               <p:pRg st="0" end="0"/>
                                             </p:txEl>
                                           </p:spTgt>
@@ -22828,26 +22935,75 @@
                     </p:cTn>
                   </p:par>
                   <p:par>
-                    <p:cTn id="9" fill="hold">
+                    <p:cTn id="7" fill="hold">
                       <p:stCondLst>
                         <p:cond delay="indefinite"/>
                       </p:stCondLst>
                       <p:childTnLst>
                         <p:par>
-                          <p:cTn id="10" fill="hold">
+                          <p:cTn id="8" fill="hold">
                             <p:stCondLst>
                               <p:cond delay="0"/>
                             </p:stCondLst>
                             <p:childTnLst>
                               <p:par>
-                                <p:cTn id="11" presetID="1" presetClass="entr" presetSubtype="0" fill="hold" nodeType="clickEffect">
+                                <p:cTn id="9" presetID="1" presetClass="entr" presetSubtype="0" fill="hold" nodeType="clickEffect">
                                   <p:stCondLst>
                                     <p:cond delay="0"/>
                                   </p:stCondLst>
                                   <p:childTnLst>
                                     <p:set>
                                       <p:cBhvr>
-                                        <p:cTn id="12" dur="1" fill="hold">
+                                        <p:cTn id="10" dur="1" fill="hold">
+                                          <p:stCondLst>
+                                            <p:cond delay="0"/>
+                                          </p:stCondLst>
+                                        </p:cTn>
+                                        <p:tgtEl>
+                                          <p:spTgt spid="13">
+                                            <p:txEl>
+                                              <p:pRg st="2" end="2"/>
+                                            </p:txEl>
+                                          </p:spTgt>
+                                        </p:tgtEl>
+                                        <p:attrNameLst>
+                                          <p:attrName>style.visibility</p:attrName>
+                                        </p:attrNameLst>
+                                      </p:cBhvr>
+                                      <p:to>
+                                        <p:strVal val="visible"/>
+                                      </p:to>
+                                    </p:set>
+                                  </p:childTnLst>
+                                </p:cTn>
+                              </p:par>
+                            </p:childTnLst>
+                          </p:cTn>
+                        </p:par>
+                      </p:childTnLst>
+                    </p:cTn>
+                  </p:par>
+                  <p:par>
+                    <p:cTn id="11" fill="hold">
+                      <p:stCondLst>
+                        <p:cond delay="indefinite"/>
+                      </p:stCondLst>
+                      <p:childTnLst>
+                        <p:par>
+                          <p:cTn id="12" fill="hold">
+                            <p:stCondLst>
+                              <p:cond delay="0"/>
+                            </p:stCondLst>
+                            <p:childTnLst>
+                              <p:par>
+                                <p:cTn id="13" presetID="1" presetClass="entr" presetSubtype="0" fill="hold" nodeType="clickEffect">
+                                  <p:stCondLst>
+                                    <p:cond delay="0"/>
+                                  </p:stCondLst>
+                                  <p:childTnLst>
+                                    <p:set>
+                                      <p:cBhvr>
+                                        <p:cTn id="14" dur="1" fill="hold">
                                           <p:stCondLst>
                                             <p:cond delay="0"/>
                                           </p:stCondLst>
@@ -22877,26 +23033,26 @@
                     </p:cTn>
                   </p:par>
                   <p:par>
-                    <p:cTn id="13" fill="hold">
+                    <p:cTn id="15" fill="hold">
                       <p:stCondLst>
                         <p:cond delay="indefinite"/>
                       </p:stCondLst>
                       <p:childTnLst>
                         <p:par>
-                          <p:cTn id="14" fill="hold">
+                          <p:cTn id="16" fill="hold">
                             <p:stCondLst>
                               <p:cond delay="0"/>
                             </p:stCondLst>
                             <p:childTnLst>
                               <p:par>
-                                <p:cTn id="15" presetID="1" presetClass="entr" presetSubtype="0" fill="hold" nodeType="clickEffect">
+                                <p:cTn id="17" presetID="1" presetClass="entr" presetSubtype="0" fill="hold" nodeType="clickEffect">
                                   <p:stCondLst>
                                     <p:cond delay="0"/>
                                   </p:stCondLst>
                                   <p:childTnLst>
                                     <p:set>
                                       <p:cBhvr>
-                                        <p:cTn id="16" dur="1" fill="hold">
+                                        <p:cTn id="18" dur="1" fill="hold">
                                           <p:stCondLst>
                                             <p:cond delay="0"/>
                                           </p:stCondLst>
@@ -22926,26 +23082,26 @@
                     </p:cTn>
                   </p:par>
                   <p:par>
-                    <p:cTn id="17" fill="hold">
+                    <p:cTn id="19" fill="hold">
                       <p:stCondLst>
                         <p:cond delay="indefinite"/>
                       </p:stCondLst>
                       <p:childTnLst>
                         <p:par>
-                          <p:cTn id="18" fill="hold">
+                          <p:cTn id="20" fill="hold">
                             <p:stCondLst>
                               <p:cond delay="0"/>
                             </p:stCondLst>
                             <p:childTnLst>
                               <p:par>
-                                <p:cTn id="19" presetID="1" presetClass="entr" presetSubtype="0" fill="hold" nodeType="clickEffect">
+                                <p:cTn id="21" presetID="1" presetClass="entr" presetSubtype="0" fill="hold" nodeType="clickEffect">
                                   <p:stCondLst>
                                     <p:cond delay="0"/>
                                   </p:stCondLst>
                                   <p:childTnLst>
                                     <p:set>
                                       <p:cBhvr>
-                                        <p:cTn id="20" dur="1" fill="hold">
+                                        <p:cTn id="22" dur="1" fill="hold">
                                           <p:stCondLst>
                                             <p:cond delay="0"/>
                                           </p:stCondLst>
@@ -22975,26 +23131,26 @@
                     </p:cTn>
                   </p:par>
                   <p:par>
-                    <p:cTn id="21" fill="hold">
+                    <p:cTn id="23" fill="hold">
                       <p:stCondLst>
                         <p:cond delay="indefinite"/>
                       </p:stCondLst>
                       <p:childTnLst>
                         <p:par>
-                          <p:cTn id="22" fill="hold">
+                          <p:cTn id="24" fill="hold">
                             <p:stCondLst>
                               <p:cond delay="0"/>
                             </p:stCondLst>
                             <p:childTnLst>
                               <p:par>
-                                <p:cTn id="23" presetID="1" presetClass="entr" presetSubtype="0" fill="hold" nodeType="clickEffect">
+                                <p:cTn id="25" presetID="1" presetClass="entr" presetSubtype="0" fill="hold" nodeType="clickEffect">
                                   <p:stCondLst>
                                     <p:cond delay="0"/>
                                   </p:stCondLst>
                                   <p:childTnLst>
                                     <p:set>
                                       <p:cBhvr>
-                                        <p:cTn id="24" dur="1" fill="hold">
+                                        <p:cTn id="26" dur="1" fill="hold">
                                           <p:stCondLst>
                                             <p:cond delay="0"/>
                                           </p:stCondLst>
@@ -27354,6 +27510,186 @@
   <p:clrMapOvr>
     <a:masterClrMapping/>
   </p:clrMapOvr>
+  <p:timing>
+    <p:tnLst>
+      <p:par>
+        <p:cTn id="1" dur="indefinite" restart="never" nodeType="tmRoot">
+          <p:childTnLst>
+            <p:seq concurrent="1" nextAc="seek">
+              <p:cTn id="2" dur="indefinite" nodeType="mainSeq">
+                <p:childTnLst>
+                  <p:par>
+                    <p:cTn id="3" fill="hold">
+                      <p:stCondLst>
+                        <p:cond delay="indefinite"/>
+                        <p:cond evt="onBegin" delay="0">
+                          <p:tn val="2"/>
+                        </p:cond>
+                      </p:stCondLst>
+                      <p:childTnLst>
+                        <p:par>
+                          <p:cTn id="4" fill="hold">
+                            <p:stCondLst>
+                              <p:cond delay="0"/>
+                            </p:stCondLst>
+                            <p:childTnLst>
+                              <p:par>
+                                <p:cTn id="5" presetID="1" presetClass="entr" presetSubtype="0" fill="hold" nodeType="withEffect">
+                                  <p:stCondLst>
+                                    <p:cond delay="0"/>
+                                  </p:stCondLst>
+                                  <p:childTnLst>
+                                    <p:set>
+                                      <p:cBhvr>
+                                        <p:cTn id="6" dur="1" fill="hold">
+                                          <p:stCondLst>
+                                            <p:cond delay="0"/>
+                                          </p:stCondLst>
+                                        </p:cTn>
+                                        <p:tgtEl>
+                                          <p:spTgt spid="8">
+                                            <p:txEl>
+                                              <p:pRg st="0" end="0"/>
+                                            </p:txEl>
+                                          </p:spTgt>
+                                        </p:tgtEl>
+                                        <p:attrNameLst>
+                                          <p:attrName>style.visibility</p:attrName>
+                                        </p:attrNameLst>
+                                      </p:cBhvr>
+                                      <p:to>
+                                        <p:strVal val="visible"/>
+                                      </p:to>
+                                    </p:set>
+                                  </p:childTnLst>
+                                </p:cTn>
+                              </p:par>
+                            </p:childTnLst>
+                          </p:cTn>
+                        </p:par>
+                      </p:childTnLst>
+                    </p:cTn>
+                  </p:par>
+                  <p:par>
+                    <p:cTn id="7" fill="hold">
+                      <p:stCondLst>
+                        <p:cond delay="indefinite"/>
+                      </p:stCondLst>
+                      <p:childTnLst>
+                        <p:par>
+                          <p:cTn id="8" fill="hold">
+                            <p:stCondLst>
+                              <p:cond delay="0"/>
+                            </p:stCondLst>
+                            <p:childTnLst>
+                              <p:par>
+                                <p:cTn id="9" presetID="1" presetClass="entr" presetSubtype="0" fill="hold" nodeType="clickEffect">
+                                  <p:stCondLst>
+                                    <p:cond delay="0"/>
+                                  </p:stCondLst>
+                                  <p:childTnLst>
+                                    <p:set>
+                                      <p:cBhvr>
+                                        <p:cTn id="10" dur="1" fill="hold">
+                                          <p:stCondLst>
+                                            <p:cond delay="0"/>
+                                          </p:stCondLst>
+                                        </p:cTn>
+                                        <p:tgtEl>
+                                          <p:spTgt spid="8">
+                                            <p:txEl>
+                                              <p:pRg st="2" end="2"/>
+                                            </p:txEl>
+                                          </p:spTgt>
+                                        </p:tgtEl>
+                                        <p:attrNameLst>
+                                          <p:attrName>style.visibility</p:attrName>
+                                        </p:attrNameLst>
+                                      </p:cBhvr>
+                                      <p:to>
+                                        <p:strVal val="visible"/>
+                                      </p:to>
+                                    </p:set>
+                                  </p:childTnLst>
+                                </p:cTn>
+                              </p:par>
+                            </p:childTnLst>
+                          </p:cTn>
+                        </p:par>
+                      </p:childTnLst>
+                    </p:cTn>
+                  </p:par>
+                  <p:par>
+                    <p:cTn id="11" fill="hold">
+                      <p:stCondLst>
+                        <p:cond delay="indefinite"/>
+                      </p:stCondLst>
+                      <p:childTnLst>
+                        <p:par>
+                          <p:cTn id="12" fill="hold">
+                            <p:stCondLst>
+                              <p:cond delay="0"/>
+                            </p:stCondLst>
+                            <p:childTnLst>
+                              <p:par>
+                                <p:cTn id="13" presetID="1" presetClass="entr" presetSubtype="0" fill="hold" nodeType="clickEffect">
+                                  <p:stCondLst>
+                                    <p:cond delay="0"/>
+                                  </p:stCondLst>
+                                  <p:childTnLst>
+                                    <p:set>
+                                      <p:cBhvr>
+                                        <p:cTn id="14" dur="1" fill="hold">
+                                          <p:stCondLst>
+                                            <p:cond delay="0"/>
+                                          </p:stCondLst>
+                                        </p:cTn>
+                                        <p:tgtEl>
+                                          <p:spTgt spid="8">
+                                            <p:txEl>
+                                              <p:pRg st="4" end="4"/>
+                                            </p:txEl>
+                                          </p:spTgt>
+                                        </p:tgtEl>
+                                        <p:attrNameLst>
+                                          <p:attrName>style.visibility</p:attrName>
+                                        </p:attrNameLst>
+                                      </p:cBhvr>
+                                      <p:to>
+                                        <p:strVal val="visible"/>
+                                      </p:to>
+                                    </p:set>
+                                  </p:childTnLst>
+                                </p:cTn>
+                              </p:par>
+                            </p:childTnLst>
+                          </p:cTn>
+                        </p:par>
+                      </p:childTnLst>
+                    </p:cTn>
+                  </p:par>
+                </p:childTnLst>
+              </p:cTn>
+              <p:prevCondLst>
+                <p:cond evt="onPrev" delay="0">
+                  <p:tgtEl>
+                    <p:sldTgt/>
+                  </p:tgtEl>
+                </p:cond>
+              </p:prevCondLst>
+              <p:nextCondLst>
+                <p:cond evt="onNext" delay="0">
+                  <p:tgtEl>
+                    <p:sldTgt/>
+                  </p:tgtEl>
+                </p:cond>
+              </p:nextCondLst>
+            </p:seq>
+          </p:childTnLst>
+        </p:cTn>
+      </p:par>
+    </p:tnLst>
+  </p:timing>
 </p:sld>
 </file>
 
@@ -28034,6 +28370,235 @@
   <p:clrMapOvr>
     <a:masterClrMapping/>
   </p:clrMapOvr>
+  <p:timing>
+    <p:tnLst>
+      <p:par>
+        <p:cTn id="1" dur="indefinite" restart="never" nodeType="tmRoot">
+          <p:childTnLst>
+            <p:seq concurrent="1" nextAc="seek">
+              <p:cTn id="2" dur="indefinite" nodeType="mainSeq">
+                <p:childTnLst>
+                  <p:par>
+                    <p:cTn id="3" fill="hold">
+                      <p:stCondLst>
+                        <p:cond delay="indefinite"/>
+                        <p:cond evt="onBegin" delay="0">
+                          <p:tn val="2"/>
+                        </p:cond>
+                      </p:stCondLst>
+                      <p:childTnLst>
+                        <p:par>
+                          <p:cTn id="4" fill="hold">
+                            <p:stCondLst>
+                              <p:cond delay="0"/>
+                            </p:stCondLst>
+                            <p:childTnLst>
+                              <p:par>
+                                <p:cTn id="5" presetID="1" presetClass="entr" presetSubtype="0" fill="hold" nodeType="withEffect">
+                                  <p:stCondLst>
+                                    <p:cond delay="0"/>
+                                  </p:stCondLst>
+                                  <p:childTnLst>
+                                    <p:set>
+                                      <p:cBhvr>
+                                        <p:cTn id="6" dur="1" fill="hold">
+                                          <p:stCondLst>
+                                            <p:cond delay="0"/>
+                                          </p:stCondLst>
+                                        </p:cTn>
+                                        <p:tgtEl>
+                                          <p:spTgt spid="8">
+                                            <p:txEl>
+                                              <p:pRg st="0" end="0"/>
+                                            </p:txEl>
+                                          </p:spTgt>
+                                        </p:tgtEl>
+                                        <p:attrNameLst>
+                                          <p:attrName>style.visibility</p:attrName>
+                                        </p:attrNameLst>
+                                      </p:cBhvr>
+                                      <p:to>
+                                        <p:strVal val="visible"/>
+                                      </p:to>
+                                    </p:set>
+                                  </p:childTnLst>
+                                </p:cTn>
+                              </p:par>
+                            </p:childTnLst>
+                          </p:cTn>
+                        </p:par>
+                      </p:childTnLst>
+                    </p:cTn>
+                  </p:par>
+                  <p:par>
+                    <p:cTn id="7" fill="hold">
+                      <p:stCondLst>
+                        <p:cond delay="indefinite"/>
+                      </p:stCondLst>
+                      <p:childTnLst>
+                        <p:par>
+                          <p:cTn id="8" fill="hold">
+                            <p:stCondLst>
+                              <p:cond delay="0"/>
+                            </p:stCondLst>
+                            <p:childTnLst>
+                              <p:par>
+                                <p:cTn id="9" presetID="1" presetClass="entr" presetSubtype="0" fill="hold" nodeType="clickEffect">
+                                  <p:stCondLst>
+                                    <p:cond delay="0"/>
+                                  </p:stCondLst>
+                                  <p:childTnLst>
+                                    <p:set>
+                                      <p:cBhvr>
+                                        <p:cTn id="10" dur="1" fill="hold">
+                                          <p:stCondLst>
+                                            <p:cond delay="0"/>
+                                          </p:stCondLst>
+                                        </p:cTn>
+                                        <p:tgtEl>
+                                          <p:spTgt spid="8">
+                                            <p:txEl>
+                                              <p:pRg st="2" end="2"/>
+                                            </p:txEl>
+                                          </p:spTgt>
+                                        </p:tgtEl>
+                                        <p:attrNameLst>
+                                          <p:attrName>style.visibility</p:attrName>
+                                        </p:attrNameLst>
+                                      </p:cBhvr>
+                                      <p:to>
+                                        <p:strVal val="visible"/>
+                                      </p:to>
+                                    </p:set>
+                                  </p:childTnLst>
+                                </p:cTn>
+                              </p:par>
+                            </p:childTnLst>
+                          </p:cTn>
+                        </p:par>
+                      </p:childTnLst>
+                    </p:cTn>
+                  </p:par>
+                  <p:par>
+                    <p:cTn id="11" fill="hold">
+                      <p:stCondLst>
+                        <p:cond delay="indefinite"/>
+                      </p:stCondLst>
+                      <p:childTnLst>
+                        <p:par>
+                          <p:cTn id="12" fill="hold">
+                            <p:stCondLst>
+                              <p:cond delay="0"/>
+                            </p:stCondLst>
+                            <p:childTnLst>
+                              <p:par>
+                                <p:cTn id="13" presetID="1" presetClass="entr" presetSubtype="0" fill="hold" nodeType="clickEffect">
+                                  <p:stCondLst>
+                                    <p:cond delay="0"/>
+                                  </p:stCondLst>
+                                  <p:childTnLst>
+                                    <p:set>
+                                      <p:cBhvr>
+                                        <p:cTn id="14" dur="1" fill="hold">
+                                          <p:stCondLst>
+                                            <p:cond delay="0"/>
+                                          </p:stCondLst>
+                                        </p:cTn>
+                                        <p:tgtEl>
+                                          <p:spTgt spid="8">
+                                            <p:txEl>
+                                              <p:pRg st="4" end="4"/>
+                                            </p:txEl>
+                                          </p:spTgt>
+                                        </p:tgtEl>
+                                        <p:attrNameLst>
+                                          <p:attrName>style.visibility</p:attrName>
+                                        </p:attrNameLst>
+                                      </p:cBhvr>
+                                      <p:to>
+                                        <p:strVal val="visible"/>
+                                      </p:to>
+                                    </p:set>
+                                  </p:childTnLst>
+                                </p:cTn>
+                              </p:par>
+                            </p:childTnLst>
+                          </p:cTn>
+                        </p:par>
+                      </p:childTnLst>
+                    </p:cTn>
+                  </p:par>
+                  <p:par>
+                    <p:cTn id="15" fill="hold">
+                      <p:stCondLst>
+                        <p:cond delay="indefinite"/>
+                      </p:stCondLst>
+                      <p:childTnLst>
+                        <p:par>
+                          <p:cTn id="16" fill="hold">
+                            <p:stCondLst>
+                              <p:cond delay="0"/>
+                            </p:stCondLst>
+                            <p:childTnLst>
+                              <p:par>
+                                <p:cTn id="17" presetID="1" presetClass="entr" presetSubtype="0" fill="hold" nodeType="clickEffect">
+                                  <p:stCondLst>
+                                    <p:cond delay="0"/>
+                                  </p:stCondLst>
+                                  <p:childTnLst>
+                                    <p:set>
+                                      <p:cBhvr>
+                                        <p:cTn id="18" dur="1" fill="hold">
+                                          <p:stCondLst>
+                                            <p:cond delay="0"/>
+                                          </p:stCondLst>
+                                        </p:cTn>
+                                        <p:tgtEl>
+                                          <p:spTgt spid="8">
+                                            <p:txEl>
+                                              <p:pRg st="6" end="6"/>
+                                            </p:txEl>
+                                          </p:spTgt>
+                                        </p:tgtEl>
+                                        <p:attrNameLst>
+                                          <p:attrName>style.visibility</p:attrName>
+                                        </p:attrNameLst>
+                                      </p:cBhvr>
+                                      <p:to>
+                                        <p:strVal val="visible"/>
+                                      </p:to>
+                                    </p:set>
+                                  </p:childTnLst>
+                                </p:cTn>
+                              </p:par>
+                            </p:childTnLst>
+                          </p:cTn>
+                        </p:par>
+                      </p:childTnLst>
+                    </p:cTn>
+                  </p:par>
+                </p:childTnLst>
+              </p:cTn>
+              <p:prevCondLst>
+                <p:cond evt="onPrev" delay="0">
+                  <p:tgtEl>
+                    <p:sldTgt/>
+                  </p:tgtEl>
+                </p:cond>
+              </p:prevCondLst>
+              <p:nextCondLst>
+                <p:cond evt="onNext" delay="0">
+                  <p:tgtEl>
+                    <p:sldTgt/>
+                  </p:tgtEl>
+                </p:cond>
+              </p:nextCondLst>
+            </p:seq>
+          </p:childTnLst>
+        </p:cTn>
+      </p:par>
+    </p:tnLst>
+  </p:timing>
 </p:sld>
 </file>
 
@@ -29218,6 +29783,589 @@
             </a:prstGeom>
             <a:grpFill/>
             <a:ln>
+              <a:solidFill>
+                <a:schemeClr val="tx1"/>
+              </a:solidFill>
+            </a:ln>
+          </p:spPr>
+          <p:style>
+            <a:lnRef idx="2">
+              <a:schemeClr val="accent1">
+                <a:shade val="50000"/>
+              </a:schemeClr>
+            </a:lnRef>
+            <a:fillRef idx="1">
+              <a:schemeClr val="accent1"/>
+            </a:fillRef>
+            <a:effectRef idx="0">
+              <a:schemeClr val="accent1"/>
+            </a:effectRef>
+            <a:fontRef idx="minor">
+              <a:schemeClr val="lt1"/>
+            </a:fontRef>
+          </p:style>
+          <p:txBody>
+            <a:bodyPr rtlCol="0" anchor="ctr"/>
+            <a:lstStyle/>
+            <a:p>
+              <a:pPr algn="ctr"/>
+              <a:endParaRPr lang="en-US" sz="1225"/>
+            </a:p>
+          </p:txBody>
+        </p:sp>
+        <p:sp>
+          <p:nvSpPr>
+            <p:cNvPr id="21" name="TextBox 20"/>
+            <p:cNvSpPr txBox="1"/>
+            <p:nvPr/>
+          </p:nvSpPr>
+          <p:spPr>
+            <a:xfrm>
+              <a:off x="501407" y="315365"/>
+              <a:ext cx="8089074" cy="400110"/>
+            </a:xfrm>
+            <a:prstGeom prst="rect">
+              <a:avLst/>
+            </a:prstGeom>
+            <a:grpFill/>
+            <a:ln>
+              <a:solidFill>
+                <a:schemeClr val="accent1"/>
+              </a:solidFill>
+            </a:ln>
+          </p:spPr>
+          <p:txBody>
+            <a:bodyPr wrap="square" rtlCol="0">
+              <a:spAutoFit/>
+            </a:bodyPr>
+            <a:lstStyle/>
+            <a:p>
+              <a:r>
+                <a:rPr lang="en-US" sz="2000" dirty="0">
+                  <a:solidFill>
+                    <a:schemeClr val="bg1"/>
+                  </a:solidFill>
+                </a:rPr>
+                <a:t>G&amp;GHDD &gt; Github.com &gt; Pull Request &gt; Workflow</a:t>
+              </a:r>
+            </a:p>
+          </p:txBody>
+        </p:sp>
+      </p:grpSp>
+      <p:sp>
+        <p:nvSpPr>
+          <p:cNvPr id="6" name="TextBox 5">
+            <a:extLst>
+              <a:ext uri="{FF2B5EF4-FFF2-40B4-BE49-F238E27FC236}">
+                <a16:creationId xmlns:a16="http://schemas.microsoft.com/office/drawing/2014/main" id="{2312A7E0-4F90-4324-A47C-E5C3A27FEC05}"/>
+              </a:ext>
+            </a:extLst>
+          </p:cNvPr>
+          <p:cNvSpPr txBox="1"/>
+          <p:nvPr/>
+        </p:nvSpPr>
+        <p:spPr>
+          <a:xfrm>
+            <a:off x="1288741" y="1669002"/>
+            <a:ext cx="9614518" cy="4216893"/>
+          </a:xfrm>
+          <a:prstGeom prst="rect">
+            <a:avLst/>
+          </a:prstGeom>
+          <a:noFill/>
+        </p:spPr>
+        <p:txBody>
+          <a:bodyPr wrap="square" lIns="0" tIns="0" rIns="0" bIns="0" rtlCol="0" anchor="t">
+            <a:noAutofit/>
+          </a:bodyPr>
+          <a:lstStyle/>
+          <a:p>
+            <a:pPr marL="457200" indent="-457200">
+              <a:buFont typeface="+mj-lt"/>
+              <a:buAutoNum type="arabicPeriod"/>
+            </a:pPr>
+            <a:r>
+              <a:rPr lang="en-US" sz="2100" dirty="0"/>
+              <a:t>Create “my-branch” based on “main”.</a:t>
+            </a:r>
+          </a:p>
+          <a:p>
+            <a:pPr marL="457200" indent="-457200">
+              <a:buFont typeface="+mj-lt"/>
+              <a:buAutoNum type="arabicPeriod"/>
+            </a:pPr>
+            <a:endParaRPr lang="en-US" sz="2100" dirty="0"/>
+          </a:p>
+          <a:p>
+            <a:pPr marL="457200" indent="-457200">
+              <a:buFont typeface="+mj-lt"/>
+              <a:buAutoNum type="arabicPeriod"/>
+            </a:pPr>
+            <a:r>
+              <a:rPr lang="en-US" sz="2100" dirty="0"/>
+              <a:t>Add commits to “my-branch”.</a:t>
+            </a:r>
+          </a:p>
+          <a:p>
+            <a:pPr marL="457200" indent="-457200">
+              <a:buFont typeface="+mj-lt"/>
+              <a:buAutoNum type="arabicPeriod"/>
+            </a:pPr>
+            <a:endParaRPr lang="en-US" sz="2100" dirty="0"/>
+          </a:p>
+          <a:p>
+            <a:pPr marL="457200" indent="-457200">
+              <a:buFont typeface="+mj-lt"/>
+              <a:buAutoNum type="arabicPeriod"/>
+            </a:pPr>
+            <a:r>
+              <a:rPr lang="en-US" sz="2100" dirty="0"/>
+              <a:t>Open a pull request from “my-branch” to “main”.</a:t>
+            </a:r>
+          </a:p>
+          <a:p>
+            <a:pPr marL="457200" indent="-457200">
+              <a:buFont typeface="+mj-lt"/>
+              <a:buAutoNum type="arabicPeriod"/>
+            </a:pPr>
+            <a:endParaRPr lang="en-US" sz="2100" dirty="0"/>
+          </a:p>
+          <a:p>
+            <a:pPr marL="457200" indent="-457200">
+              <a:buFont typeface="+mj-lt"/>
+              <a:buAutoNum type="arabicPeriod"/>
+            </a:pPr>
+            <a:r>
+              <a:rPr lang="en-US" sz="2100" dirty="0"/>
+              <a:t>Discuss and review code in pull request.</a:t>
+            </a:r>
+          </a:p>
+          <a:p>
+            <a:pPr marL="457200" indent="-457200">
+              <a:buFont typeface="+mj-lt"/>
+              <a:buAutoNum type="arabicPeriod"/>
+            </a:pPr>
+            <a:endParaRPr lang="en-US" sz="2100" dirty="0"/>
+          </a:p>
+          <a:p>
+            <a:pPr marL="457200" indent="-457200">
+              <a:buFont typeface="+mj-lt"/>
+              <a:buAutoNum type="arabicPeriod"/>
+            </a:pPr>
+            <a:r>
+              <a:rPr lang="en-US" sz="2100" dirty="0"/>
+              <a:t>Deploy “my-branch” to test environment for regression testing.</a:t>
+            </a:r>
+          </a:p>
+          <a:p>
+            <a:pPr marL="457200" indent="-457200">
+              <a:buFont typeface="+mj-lt"/>
+              <a:buAutoNum type="arabicPeriod"/>
+            </a:pPr>
+            <a:endParaRPr lang="en-US" sz="2100" dirty="0"/>
+          </a:p>
+          <a:p>
+            <a:pPr marL="457200" indent="-457200">
+              <a:buFont typeface="+mj-lt"/>
+              <a:buAutoNum type="arabicPeriod"/>
+            </a:pPr>
+            <a:r>
+              <a:rPr lang="en-US" sz="2100" dirty="0"/>
+              <a:t>Approve pull request and merge code from “my-branch” into “main”.</a:t>
+            </a:r>
+          </a:p>
+        </p:txBody>
+      </p:sp>
+    </p:spTree>
+    <p:extLst>
+      <p:ext uri="{BB962C8B-B14F-4D97-AF65-F5344CB8AC3E}">
+        <p14:creationId xmlns:p14="http://schemas.microsoft.com/office/powerpoint/2010/main" val="2266086276"/>
+      </p:ext>
+    </p:extLst>
+  </p:cSld>
+  <p:clrMapOvr>
+    <a:masterClrMapping/>
+  </p:clrMapOvr>
+  <p:timing>
+    <p:tnLst>
+      <p:par>
+        <p:cTn id="1" dur="indefinite" restart="never" nodeType="tmRoot">
+          <p:childTnLst>
+            <p:seq concurrent="1" nextAc="seek">
+              <p:cTn id="2" dur="indefinite" nodeType="mainSeq">
+                <p:childTnLst>
+                  <p:par>
+                    <p:cTn id="3" fill="hold">
+                      <p:stCondLst>
+                        <p:cond delay="indefinite"/>
+                        <p:cond evt="onBegin" delay="0">
+                          <p:tn val="2"/>
+                        </p:cond>
+                      </p:stCondLst>
+                      <p:childTnLst>
+                        <p:par>
+                          <p:cTn id="4" fill="hold">
+                            <p:stCondLst>
+                              <p:cond delay="0"/>
+                            </p:stCondLst>
+                            <p:childTnLst>
+                              <p:par>
+                                <p:cTn id="5" presetID="1" presetClass="entr" presetSubtype="0" fill="hold" nodeType="withEffect">
+                                  <p:stCondLst>
+                                    <p:cond delay="0"/>
+                                  </p:stCondLst>
+                                  <p:childTnLst>
+                                    <p:set>
+                                      <p:cBhvr>
+                                        <p:cTn id="6" dur="1" fill="hold">
+                                          <p:stCondLst>
+                                            <p:cond delay="0"/>
+                                          </p:stCondLst>
+                                        </p:cTn>
+                                        <p:tgtEl>
+                                          <p:spTgt spid="6">
+                                            <p:txEl>
+                                              <p:pRg st="0" end="0"/>
+                                            </p:txEl>
+                                          </p:spTgt>
+                                        </p:tgtEl>
+                                        <p:attrNameLst>
+                                          <p:attrName>style.visibility</p:attrName>
+                                        </p:attrNameLst>
+                                      </p:cBhvr>
+                                      <p:to>
+                                        <p:strVal val="visible"/>
+                                      </p:to>
+                                    </p:set>
+                                  </p:childTnLst>
+                                </p:cTn>
+                              </p:par>
+                            </p:childTnLst>
+                          </p:cTn>
+                        </p:par>
+                      </p:childTnLst>
+                    </p:cTn>
+                  </p:par>
+                  <p:par>
+                    <p:cTn id="7" fill="hold">
+                      <p:stCondLst>
+                        <p:cond delay="indefinite"/>
+                      </p:stCondLst>
+                      <p:childTnLst>
+                        <p:par>
+                          <p:cTn id="8" fill="hold">
+                            <p:stCondLst>
+                              <p:cond delay="0"/>
+                            </p:stCondLst>
+                            <p:childTnLst>
+                              <p:par>
+                                <p:cTn id="9" presetID="1" presetClass="entr" presetSubtype="0" fill="hold" nodeType="clickEffect">
+                                  <p:stCondLst>
+                                    <p:cond delay="0"/>
+                                  </p:stCondLst>
+                                  <p:childTnLst>
+                                    <p:set>
+                                      <p:cBhvr>
+                                        <p:cTn id="10" dur="1" fill="hold">
+                                          <p:stCondLst>
+                                            <p:cond delay="0"/>
+                                          </p:stCondLst>
+                                        </p:cTn>
+                                        <p:tgtEl>
+                                          <p:spTgt spid="6">
+                                            <p:txEl>
+                                              <p:pRg st="2" end="2"/>
+                                            </p:txEl>
+                                          </p:spTgt>
+                                        </p:tgtEl>
+                                        <p:attrNameLst>
+                                          <p:attrName>style.visibility</p:attrName>
+                                        </p:attrNameLst>
+                                      </p:cBhvr>
+                                      <p:to>
+                                        <p:strVal val="visible"/>
+                                      </p:to>
+                                    </p:set>
+                                  </p:childTnLst>
+                                </p:cTn>
+                              </p:par>
+                            </p:childTnLst>
+                          </p:cTn>
+                        </p:par>
+                      </p:childTnLst>
+                    </p:cTn>
+                  </p:par>
+                  <p:par>
+                    <p:cTn id="11" fill="hold">
+                      <p:stCondLst>
+                        <p:cond delay="indefinite"/>
+                      </p:stCondLst>
+                      <p:childTnLst>
+                        <p:par>
+                          <p:cTn id="12" fill="hold">
+                            <p:stCondLst>
+                              <p:cond delay="0"/>
+                            </p:stCondLst>
+                            <p:childTnLst>
+                              <p:par>
+                                <p:cTn id="13" presetID="1" presetClass="entr" presetSubtype="0" fill="hold" nodeType="clickEffect">
+                                  <p:stCondLst>
+                                    <p:cond delay="0"/>
+                                  </p:stCondLst>
+                                  <p:childTnLst>
+                                    <p:set>
+                                      <p:cBhvr>
+                                        <p:cTn id="14" dur="1" fill="hold">
+                                          <p:stCondLst>
+                                            <p:cond delay="0"/>
+                                          </p:stCondLst>
+                                        </p:cTn>
+                                        <p:tgtEl>
+                                          <p:spTgt spid="6">
+                                            <p:txEl>
+                                              <p:pRg st="4" end="4"/>
+                                            </p:txEl>
+                                          </p:spTgt>
+                                        </p:tgtEl>
+                                        <p:attrNameLst>
+                                          <p:attrName>style.visibility</p:attrName>
+                                        </p:attrNameLst>
+                                      </p:cBhvr>
+                                      <p:to>
+                                        <p:strVal val="visible"/>
+                                      </p:to>
+                                    </p:set>
+                                  </p:childTnLst>
+                                </p:cTn>
+                              </p:par>
+                            </p:childTnLst>
+                          </p:cTn>
+                        </p:par>
+                      </p:childTnLst>
+                    </p:cTn>
+                  </p:par>
+                  <p:par>
+                    <p:cTn id="15" fill="hold">
+                      <p:stCondLst>
+                        <p:cond delay="indefinite"/>
+                      </p:stCondLst>
+                      <p:childTnLst>
+                        <p:par>
+                          <p:cTn id="16" fill="hold">
+                            <p:stCondLst>
+                              <p:cond delay="0"/>
+                            </p:stCondLst>
+                            <p:childTnLst>
+                              <p:par>
+                                <p:cTn id="17" presetID="1" presetClass="entr" presetSubtype="0" fill="hold" nodeType="clickEffect">
+                                  <p:stCondLst>
+                                    <p:cond delay="0"/>
+                                  </p:stCondLst>
+                                  <p:childTnLst>
+                                    <p:set>
+                                      <p:cBhvr>
+                                        <p:cTn id="18" dur="1" fill="hold">
+                                          <p:stCondLst>
+                                            <p:cond delay="0"/>
+                                          </p:stCondLst>
+                                        </p:cTn>
+                                        <p:tgtEl>
+                                          <p:spTgt spid="6">
+                                            <p:txEl>
+                                              <p:pRg st="6" end="6"/>
+                                            </p:txEl>
+                                          </p:spTgt>
+                                        </p:tgtEl>
+                                        <p:attrNameLst>
+                                          <p:attrName>style.visibility</p:attrName>
+                                        </p:attrNameLst>
+                                      </p:cBhvr>
+                                      <p:to>
+                                        <p:strVal val="visible"/>
+                                      </p:to>
+                                    </p:set>
+                                  </p:childTnLst>
+                                </p:cTn>
+                              </p:par>
+                            </p:childTnLst>
+                          </p:cTn>
+                        </p:par>
+                      </p:childTnLst>
+                    </p:cTn>
+                  </p:par>
+                  <p:par>
+                    <p:cTn id="19" fill="hold">
+                      <p:stCondLst>
+                        <p:cond delay="indefinite"/>
+                      </p:stCondLst>
+                      <p:childTnLst>
+                        <p:par>
+                          <p:cTn id="20" fill="hold">
+                            <p:stCondLst>
+                              <p:cond delay="0"/>
+                            </p:stCondLst>
+                            <p:childTnLst>
+                              <p:par>
+                                <p:cTn id="21" presetID="1" presetClass="entr" presetSubtype="0" fill="hold" nodeType="clickEffect">
+                                  <p:stCondLst>
+                                    <p:cond delay="0"/>
+                                  </p:stCondLst>
+                                  <p:childTnLst>
+                                    <p:set>
+                                      <p:cBhvr>
+                                        <p:cTn id="22" dur="1" fill="hold">
+                                          <p:stCondLst>
+                                            <p:cond delay="0"/>
+                                          </p:stCondLst>
+                                        </p:cTn>
+                                        <p:tgtEl>
+                                          <p:spTgt spid="6">
+                                            <p:txEl>
+                                              <p:pRg st="8" end="8"/>
+                                            </p:txEl>
+                                          </p:spTgt>
+                                        </p:tgtEl>
+                                        <p:attrNameLst>
+                                          <p:attrName>style.visibility</p:attrName>
+                                        </p:attrNameLst>
+                                      </p:cBhvr>
+                                      <p:to>
+                                        <p:strVal val="visible"/>
+                                      </p:to>
+                                    </p:set>
+                                  </p:childTnLst>
+                                </p:cTn>
+                              </p:par>
+                            </p:childTnLst>
+                          </p:cTn>
+                        </p:par>
+                      </p:childTnLst>
+                    </p:cTn>
+                  </p:par>
+                  <p:par>
+                    <p:cTn id="23" fill="hold">
+                      <p:stCondLst>
+                        <p:cond delay="indefinite"/>
+                      </p:stCondLst>
+                      <p:childTnLst>
+                        <p:par>
+                          <p:cTn id="24" fill="hold">
+                            <p:stCondLst>
+                              <p:cond delay="0"/>
+                            </p:stCondLst>
+                            <p:childTnLst>
+                              <p:par>
+                                <p:cTn id="25" presetID="1" presetClass="entr" presetSubtype="0" fill="hold" nodeType="clickEffect">
+                                  <p:stCondLst>
+                                    <p:cond delay="0"/>
+                                  </p:stCondLst>
+                                  <p:childTnLst>
+                                    <p:set>
+                                      <p:cBhvr>
+                                        <p:cTn id="26" dur="1" fill="hold">
+                                          <p:stCondLst>
+                                            <p:cond delay="0"/>
+                                          </p:stCondLst>
+                                        </p:cTn>
+                                        <p:tgtEl>
+                                          <p:spTgt spid="6">
+                                            <p:txEl>
+                                              <p:pRg st="10" end="10"/>
+                                            </p:txEl>
+                                          </p:spTgt>
+                                        </p:tgtEl>
+                                        <p:attrNameLst>
+                                          <p:attrName>style.visibility</p:attrName>
+                                        </p:attrNameLst>
+                                      </p:cBhvr>
+                                      <p:to>
+                                        <p:strVal val="visible"/>
+                                      </p:to>
+                                    </p:set>
+                                  </p:childTnLst>
+                                </p:cTn>
+                              </p:par>
+                            </p:childTnLst>
+                          </p:cTn>
+                        </p:par>
+                      </p:childTnLst>
+                    </p:cTn>
+                  </p:par>
+                </p:childTnLst>
+              </p:cTn>
+              <p:prevCondLst>
+                <p:cond evt="onPrev" delay="0">
+                  <p:tgtEl>
+                    <p:sldTgt/>
+                  </p:tgtEl>
+                </p:cond>
+              </p:prevCondLst>
+              <p:nextCondLst>
+                <p:cond evt="onNext" delay="0">
+                  <p:tgtEl>
+                    <p:sldTgt/>
+                  </p:tgtEl>
+                </p:cond>
+              </p:nextCondLst>
+            </p:seq>
+          </p:childTnLst>
+        </p:cTn>
+      </p:par>
+    </p:tnLst>
+  </p:timing>
+</p:sld>
+</file>
+
+<file path=ppt/slides/slide29.xml><?xml version="1.0" encoding="utf-8"?>
+<p:sld xmlns:a="http://schemas.openxmlformats.org/drawingml/2006/main" xmlns:r="http://schemas.openxmlformats.org/officeDocument/2006/relationships" xmlns:p="http://schemas.openxmlformats.org/presentationml/2006/main">
+  <p:cSld>
+    <p:spTree>
+      <p:nvGrpSpPr>
+        <p:cNvPr id="1" name=""/>
+        <p:cNvGrpSpPr/>
+        <p:nvPr/>
+      </p:nvGrpSpPr>
+      <p:grpSpPr>
+        <a:xfrm>
+          <a:off x="0" y="0"/>
+          <a:ext cx="0" cy="0"/>
+          <a:chOff x="0" y="0"/>
+          <a:chExt cx="0" cy="0"/>
+        </a:xfrm>
+      </p:grpSpPr>
+      <p:grpSp>
+        <p:nvGrpSpPr>
+          <p:cNvPr id="13" name="Group 12"/>
+          <p:cNvGrpSpPr/>
+          <p:nvPr/>
+        </p:nvGrpSpPr>
+        <p:grpSpPr>
+          <a:xfrm>
+            <a:off x="2" y="2"/>
+            <a:ext cx="12191999" cy="948335"/>
+            <a:chOff x="0" y="0"/>
+            <a:chExt cx="12192000" cy="948335"/>
+          </a:xfrm>
+          <a:solidFill>
+            <a:schemeClr val="accent1"/>
+          </a:solidFill>
+        </p:grpSpPr>
+        <p:sp>
+          <p:nvSpPr>
+            <p:cNvPr id="2" name="Rectangle 1"/>
+            <p:cNvSpPr/>
+            <p:nvPr/>
+          </p:nvSpPr>
+          <p:spPr>
+            <a:xfrm>
+              <a:off x="0" y="0"/>
+              <a:ext cx="12192000" cy="948335"/>
+            </a:xfrm>
+            <a:prstGeom prst="rect">
+              <a:avLst/>
+            </a:prstGeom>
+            <a:grpFill/>
+            <a:ln>
               <a:noFill/>
             </a:ln>
           </p:spPr>
@@ -29356,138 +30504,6 @@
     <p:extLst>
       <p:ext uri="{BB962C8B-B14F-4D97-AF65-F5344CB8AC3E}">
         <p14:creationId xmlns:p14="http://schemas.microsoft.com/office/powerpoint/2010/main" val="491237519"/>
-      </p:ext>
-    </p:extLst>
-  </p:cSld>
-  <p:clrMapOvr>
-    <a:masterClrMapping/>
-  </p:clrMapOvr>
-</p:sld>
-</file>
-
-<file path=ppt/slides/slide29.xml><?xml version="1.0" encoding="utf-8"?>
-<p:sld xmlns:a="http://schemas.openxmlformats.org/drawingml/2006/main" xmlns:r="http://schemas.openxmlformats.org/officeDocument/2006/relationships" xmlns:p="http://schemas.openxmlformats.org/presentationml/2006/main">
-  <p:cSld>
-    <p:spTree>
-      <p:nvGrpSpPr>
-        <p:cNvPr id="1" name=""/>
-        <p:cNvGrpSpPr/>
-        <p:nvPr/>
-      </p:nvGrpSpPr>
-      <p:grpSpPr>
-        <a:xfrm>
-          <a:off x="0" y="0"/>
-          <a:ext cx="0" cy="0"/>
-          <a:chOff x="0" y="0"/>
-          <a:chExt cx="0" cy="0"/>
-        </a:xfrm>
-      </p:grpSpPr>
-      <p:grpSp>
-        <p:nvGrpSpPr>
-          <p:cNvPr id="13" name="Group 12"/>
-          <p:cNvGrpSpPr/>
-          <p:nvPr/>
-        </p:nvGrpSpPr>
-        <p:grpSpPr>
-          <a:xfrm>
-            <a:off x="2" y="2"/>
-            <a:ext cx="12191999" cy="948335"/>
-            <a:chOff x="0" y="0"/>
-            <a:chExt cx="12192000" cy="948335"/>
-          </a:xfrm>
-          <a:solidFill>
-            <a:schemeClr val="accent1"/>
-          </a:solidFill>
-        </p:grpSpPr>
-        <p:sp>
-          <p:nvSpPr>
-            <p:cNvPr id="2" name="Rectangle 1"/>
-            <p:cNvSpPr/>
-            <p:nvPr/>
-          </p:nvSpPr>
-          <p:spPr>
-            <a:xfrm>
-              <a:off x="0" y="0"/>
-              <a:ext cx="12192000" cy="948335"/>
-            </a:xfrm>
-            <a:prstGeom prst="rect">
-              <a:avLst/>
-            </a:prstGeom>
-            <a:grpFill/>
-            <a:ln>
-              <a:solidFill>
-                <a:schemeClr val="tx1"/>
-              </a:solidFill>
-            </a:ln>
-          </p:spPr>
-          <p:style>
-            <a:lnRef idx="2">
-              <a:schemeClr val="accent1">
-                <a:shade val="50000"/>
-              </a:schemeClr>
-            </a:lnRef>
-            <a:fillRef idx="1">
-              <a:schemeClr val="accent1"/>
-            </a:fillRef>
-            <a:effectRef idx="0">
-              <a:schemeClr val="accent1"/>
-            </a:effectRef>
-            <a:fontRef idx="minor">
-              <a:schemeClr val="lt1"/>
-            </a:fontRef>
-          </p:style>
-          <p:txBody>
-            <a:bodyPr rtlCol="0" anchor="ctr"/>
-            <a:lstStyle/>
-            <a:p>
-              <a:pPr algn="ctr"/>
-              <a:endParaRPr lang="en-US" sz="1225"/>
-            </a:p>
-          </p:txBody>
-        </p:sp>
-        <p:sp>
-          <p:nvSpPr>
-            <p:cNvPr id="21" name="TextBox 20"/>
-            <p:cNvSpPr txBox="1"/>
-            <p:nvPr/>
-          </p:nvSpPr>
-          <p:spPr>
-            <a:xfrm>
-              <a:off x="501407" y="315365"/>
-              <a:ext cx="8089074" cy="400110"/>
-            </a:xfrm>
-            <a:prstGeom prst="rect">
-              <a:avLst/>
-            </a:prstGeom>
-            <a:grpFill/>
-            <a:ln>
-              <a:solidFill>
-                <a:schemeClr val="accent1"/>
-              </a:solidFill>
-            </a:ln>
-          </p:spPr>
-          <p:txBody>
-            <a:bodyPr wrap="square" rtlCol="0">
-              <a:spAutoFit/>
-            </a:bodyPr>
-            <a:lstStyle/>
-            <a:p>
-              <a:r>
-                <a:rPr lang="en-US" sz="2000" dirty="0">
-                  <a:solidFill>
-                    <a:schemeClr val="bg1"/>
-                  </a:solidFill>
-                </a:rPr>
-                <a:t>G&amp;GHDD &gt; Github.com &gt; SSH</a:t>
-              </a:r>
-            </a:p>
-          </p:txBody>
-        </p:sp>
-      </p:grpSp>
-    </p:spTree>
-    <p:extLst>
-      <p:ext uri="{BB962C8B-B14F-4D97-AF65-F5344CB8AC3E}">
-        <p14:creationId xmlns:p14="http://schemas.microsoft.com/office/powerpoint/2010/main" val="1497820032"/>
       </p:ext>
     </p:extLst>
   </p:cSld>
@@ -29715,6 +30731,523 @@
             </a:prstGeom>
             <a:grpFill/>
             <a:ln>
+              <a:solidFill>
+                <a:schemeClr val="tx1"/>
+              </a:solidFill>
+            </a:ln>
+          </p:spPr>
+          <p:style>
+            <a:lnRef idx="2">
+              <a:schemeClr val="accent1">
+                <a:shade val="50000"/>
+              </a:schemeClr>
+            </a:lnRef>
+            <a:fillRef idx="1">
+              <a:schemeClr val="accent1"/>
+            </a:fillRef>
+            <a:effectRef idx="0">
+              <a:schemeClr val="accent1"/>
+            </a:effectRef>
+            <a:fontRef idx="minor">
+              <a:schemeClr val="lt1"/>
+            </a:fontRef>
+          </p:style>
+          <p:txBody>
+            <a:bodyPr rtlCol="0" anchor="ctr"/>
+            <a:lstStyle/>
+            <a:p>
+              <a:pPr algn="ctr"/>
+              <a:endParaRPr lang="en-US" sz="1225"/>
+            </a:p>
+          </p:txBody>
+        </p:sp>
+        <p:sp>
+          <p:nvSpPr>
+            <p:cNvPr id="21" name="TextBox 20"/>
+            <p:cNvSpPr txBox="1"/>
+            <p:nvPr/>
+          </p:nvSpPr>
+          <p:spPr>
+            <a:xfrm>
+              <a:off x="501407" y="315365"/>
+              <a:ext cx="8089074" cy="400110"/>
+            </a:xfrm>
+            <a:prstGeom prst="rect">
+              <a:avLst/>
+            </a:prstGeom>
+            <a:grpFill/>
+            <a:ln>
+              <a:solidFill>
+                <a:schemeClr val="accent1"/>
+              </a:solidFill>
+            </a:ln>
+          </p:spPr>
+          <p:txBody>
+            <a:bodyPr wrap="square" rtlCol="0">
+              <a:spAutoFit/>
+            </a:bodyPr>
+            <a:lstStyle/>
+            <a:p>
+              <a:r>
+                <a:rPr lang="en-US" sz="2000" dirty="0">
+                  <a:solidFill>
+                    <a:schemeClr val="bg1"/>
+                  </a:solidFill>
+                </a:rPr>
+                <a:t>G&amp;GHDD &gt; Github.com &gt; SSH</a:t>
+              </a:r>
+            </a:p>
+          </p:txBody>
+        </p:sp>
+      </p:grpSp>
+      <p:sp>
+        <p:nvSpPr>
+          <p:cNvPr id="5" name="TextBox 4">
+            <a:extLst>
+              <a:ext uri="{FF2B5EF4-FFF2-40B4-BE49-F238E27FC236}">
+                <a16:creationId xmlns:a16="http://schemas.microsoft.com/office/drawing/2014/main" id="{7A770F2A-AB05-443F-81A9-B2346B401C4B}"/>
+              </a:ext>
+            </a:extLst>
+          </p:cNvPr>
+          <p:cNvSpPr txBox="1"/>
+          <p:nvPr/>
+        </p:nvSpPr>
+        <p:spPr>
+          <a:xfrm>
+            <a:off x="1288741" y="1669002"/>
+            <a:ext cx="9614518" cy="4216893"/>
+          </a:xfrm>
+          <a:prstGeom prst="rect">
+            <a:avLst/>
+          </a:prstGeom>
+          <a:noFill/>
+        </p:spPr>
+        <p:txBody>
+          <a:bodyPr wrap="square" lIns="0" tIns="0" rIns="0" bIns="0" rtlCol="0" anchor="t">
+            <a:noAutofit/>
+          </a:bodyPr>
+          <a:lstStyle/>
+          <a:p>
+            <a:pPr marL="342900" indent="-342900">
+              <a:buFont typeface="Arial" panose="020B0604020202020204" pitchFamily="34" charset="0"/>
+              <a:buChar char="•"/>
+            </a:pPr>
+            <a:r>
+              <a:rPr lang="en-US" sz="2100" dirty="0"/>
+              <a:t>Using the SSH protocol, you can connect and authenticate to remote servers and services. </a:t>
+            </a:r>
+          </a:p>
+          <a:p>
+            <a:pPr marL="342900" indent="-342900">
+              <a:buFont typeface="Arial" panose="020B0604020202020204" pitchFamily="34" charset="0"/>
+              <a:buChar char="•"/>
+            </a:pPr>
+            <a:endParaRPr lang="en-US" sz="2100" dirty="0"/>
+          </a:p>
+          <a:p>
+            <a:pPr marL="342900" indent="-342900">
+              <a:buFont typeface="Arial" panose="020B0604020202020204" pitchFamily="34" charset="0"/>
+              <a:buChar char="•"/>
+            </a:pPr>
+            <a:r>
+              <a:rPr lang="en-US" sz="2100" dirty="0"/>
+              <a:t>With SSH keys, you can connect to GitHub.com without supplying your username or password at each visit.</a:t>
+            </a:r>
+          </a:p>
+          <a:p>
+            <a:pPr marL="342900" indent="-342900">
+              <a:buFont typeface="Arial" panose="020B0604020202020204" pitchFamily="34" charset="0"/>
+              <a:buChar char="•"/>
+            </a:pPr>
+            <a:endParaRPr lang="en-US" sz="2100" dirty="0"/>
+          </a:p>
+          <a:p>
+            <a:pPr marL="342900" indent="-342900">
+              <a:buFont typeface="Arial" panose="020B0604020202020204" pitchFamily="34" charset="0"/>
+              <a:buChar char="•"/>
+            </a:pPr>
+            <a:r>
+              <a:rPr lang="en-US" sz="2100" dirty="0"/>
+              <a:t>To use your SSH key you'll need to add it to your account via GitHub.com.</a:t>
+            </a:r>
+          </a:p>
+          <a:p>
+            <a:pPr marL="342900" indent="-342900">
+              <a:buFont typeface="Arial" panose="020B0604020202020204" pitchFamily="34" charset="0"/>
+              <a:buChar char="•"/>
+            </a:pPr>
+            <a:endParaRPr lang="en-US" sz="2100" dirty="0"/>
+          </a:p>
+          <a:p>
+            <a:pPr marL="342900" indent="-342900">
+              <a:buFont typeface="Arial" panose="020B0604020202020204" pitchFamily="34" charset="0"/>
+              <a:buChar char="•"/>
+            </a:pPr>
+            <a:r>
+              <a:rPr lang="en-US" sz="2100" dirty="0"/>
+              <a:t>If you haven't used your SSH key for a year, then GitHub.com will automatically delete your inactive SSH key as a security precaution.</a:t>
+            </a:r>
+          </a:p>
+          <a:p>
+            <a:pPr marL="342900" indent="-342900">
+              <a:buFont typeface="Arial" panose="020B0604020202020204" pitchFamily="34" charset="0"/>
+              <a:buChar char="•"/>
+            </a:pPr>
+            <a:endParaRPr lang="en-US" sz="2100" dirty="0"/>
+          </a:p>
+          <a:p>
+            <a:pPr marL="342900" indent="-342900">
+              <a:buFont typeface="Arial" panose="020B0604020202020204" pitchFamily="34" charset="0"/>
+              <a:buChar char="•"/>
+            </a:pPr>
+            <a:r>
+              <a:rPr lang="en-US" sz="2100" dirty="0"/>
+              <a:t>If you're a member of an organization that provides SSH certificates, you can use your certificate to access that organization's repositories without adding the certificate to your GitHub account.</a:t>
+            </a:r>
+          </a:p>
+        </p:txBody>
+      </p:sp>
+    </p:spTree>
+    <p:extLst>
+      <p:ext uri="{BB962C8B-B14F-4D97-AF65-F5344CB8AC3E}">
+        <p14:creationId xmlns:p14="http://schemas.microsoft.com/office/powerpoint/2010/main" val="1497820032"/>
+      </p:ext>
+    </p:extLst>
+  </p:cSld>
+  <p:clrMapOvr>
+    <a:masterClrMapping/>
+  </p:clrMapOvr>
+  <p:timing>
+    <p:tnLst>
+      <p:par>
+        <p:cTn id="1" dur="indefinite" restart="never" nodeType="tmRoot">
+          <p:childTnLst>
+            <p:seq concurrent="1" nextAc="seek">
+              <p:cTn id="2" dur="indefinite" nodeType="mainSeq">
+                <p:childTnLst>
+                  <p:par>
+                    <p:cTn id="3" fill="hold">
+                      <p:stCondLst>
+                        <p:cond delay="indefinite"/>
+                        <p:cond evt="onBegin" delay="0">
+                          <p:tn val="2"/>
+                        </p:cond>
+                      </p:stCondLst>
+                      <p:childTnLst>
+                        <p:par>
+                          <p:cTn id="4" fill="hold">
+                            <p:stCondLst>
+                              <p:cond delay="0"/>
+                            </p:stCondLst>
+                            <p:childTnLst>
+                              <p:par>
+                                <p:cTn id="5" presetID="1" presetClass="entr" presetSubtype="0" fill="hold" nodeType="withEffect">
+                                  <p:stCondLst>
+                                    <p:cond delay="0"/>
+                                  </p:stCondLst>
+                                  <p:childTnLst>
+                                    <p:set>
+                                      <p:cBhvr>
+                                        <p:cTn id="6" dur="1" fill="hold">
+                                          <p:stCondLst>
+                                            <p:cond delay="0"/>
+                                          </p:stCondLst>
+                                        </p:cTn>
+                                        <p:tgtEl>
+                                          <p:spTgt spid="5">
+                                            <p:txEl>
+                                              <p:pRg st="0" end="0"/>
+                                            </p:txEl>
+                                          </p:spTgt>
+                                        </p:tgtEl>
+                                        <p:attrNameLst>
+                                          <p:attrName>style.visibility</p:attrName>
+                                        </p:attrNameLst>
+                                      </p:cBhvr>
+                                      <p:to>
+                                        <p:strVal val="visible"/>
+                                      </p:to>
+                                    </p:set>
+                                  </p:childTnLst>
+                                </p:cTn>
+                              </p:par>
+                            </p:childTnLst>
+                          </p:cTn>
+                        </p:par>
+                      </p:childTnLst>
+                    </p:cTn>
+                  </p:par>
+                  <p:par>
+                    <p:cTn id="7" fill="hold">
+                      <p:stCondLst>
+                        <p:cond delay="indefinite"/>
+                      </p:stCondLst>
+                      <p:childTnLst>
+                        <p:par>
+                          <p:cTn id="8" fill="hold">
+                            <p:stCondLst>
+                              <p:cond delay="0"/>
+                            </p:stCondLst>
+                            <p:childTnLst>
+                              <p:par>
+                                <p:cTn id="9" presetID="1" presetClass="entr" presetSubtype="0" fill="hold" nodeType="clickEffect">
+                                  <p:stCondLst>
+                                    <p:cond delay="0"/>
+                                  </p:stCondLst>
+                                  <p:childTnLst>
+                                    <p:set>
+                                      <p:cBhvr>
+                                        <p:cTn id="10" dur="1" fill="hold">
+                                          <p:stCondLst>
+                                            <p:cond delay="0"/>
+                                          </p:stCondLst>
+                                        </p:cTn>
+                                        <p:tgtEl>
+                                          <p:spTgt spid="5">
+                                            <p:txEl>
+                                              <p:pRg st="2" end="2"/>
+                                            </p:txEl>
+                                          </p:spTgt>
+                                        </p:tgtEl>
+                                        <p:attrNameLst>
+                                          <p:attrName>style.visibility</p:attrName>
+                                        </p:attrNameLst>
+                                      </p:cBhvr>
+                                      <p:to>
+                                        <p:strVal val="visible"/>
+                                      </p:to>
+                                    </p:set>
+                                  </p:childTnLst>
+                                </p:cTn>
+                              </p:par>
+                            </p:childTnLst>
+                          </p:cTn>
+                        </p:par>
+                      </p:childTnLst>
+                    </p:cTn>
+                  </p:par>
+                  <p:par>
+                    <p:cTn id="11" fill="hold">
+                      <p:stCondLst>
+                        <p:cond delay="indefinite"/>
+                      </p:stCondLst>
+                      <p:childTnLst>
+                        <p:par>
+                          <p:cTn id="12" fill="hold">
+                            <p:stCondLst>
+                              <p:cond delay="0"/>
+                            </p:stCondLst>
+                            <p:childTnLst>
+                              <p:par>
+                                <p:cTn id="13" presetID="1" presetClass="entr" presetSubtype="0" fill="hold" nodeType="clickEffect">
+                                  <p:stCondLst>
+                                    <p:cond delay="0"/>
+                                  </p:stCondLst>
+                                  <p:childTnLst>
+                                    <p:set>
+                                      <p:cBhvr>
+                                        <p:cTn id="14" dur="1" fill="hold">
+                                          <p:stCondLst>
+                                            <p:cond delay="0"/>
+                                          </p:stCondLst>
+                                        </p:cTn>
+                                        <p:tgtEl>
+                                          <p:spTgt spid="5">
+                                            <p:txEl>
+                                              <p:pRg st="4" end="4"/>
+                                            </p:txEl>
+                                          </p:spTgt>
+                                        </p:tgtEl>
+                                        <p:attrNameLst>
+                                          <p:attrName>style.visibility</p:attrName>
+                                        </p:attrNameLst>
+                                      </p:cBhvr>
+                                      <p:to>
+                                        <p:strVal val="visible"/>
+                                      </p:to>
+                                    </p:set>
+                                  </p:childTnLst>
+                                </p:cTn>
+                              </p:par>
+                            </p:childTnLst>
+                          </p:cTn>
+                        </p:par>
+                      </p:childTnLst>
+                    </p:cTn>
+                  </p:par>
+                  <p:par>
+                    <p:cTn id="15" fill="hold">
+                      <p:stCondLst>
+                        <p:cond delay="indefinite"/>
+                      </p:stCondLst>
+                      <p:childTnLst>
+                        <p:par>
+                          <p:cTn id="16" fill="hold">
+                            <p:stCondLst>
+                              <p:cond delay="0"/>
+                            </p:stCondLst>
+                            <p:childTnLst>
+                              <p:par>
+                                <p:cTn id="17" presetID="1" presetClass="entr" presetSubtype="0" fill="hold" nodeType="clickEffect">
+                                  <p:stCondLst>
+                                    <p:cond delay="0"/>
+                                  </p:stCondLst>
+                                  <p:childTnLst>
+                                    <p:set>
+                                      <p:cBhvr>
+                                        <p:cTn id="18" dur="1" fill="hold">
+                                          <p:stCondLst>
+                                            <p:cond delay="0"/>
+                                          </p:stCondLst>
+                                        </p:cTn>
+                                        <p:tgtEl>
+                                          <p:spTgt spid="5">
+                                            <p:txEl>
+                                              <p:pRg st="6" end="6"/>
+                                            </p:txEl>
+                                          </p:spTgt>
+                                        </p:tgtEl>
+                                        <p:attrNameLst>
+                                          <p:attrName>style.visibility</p:attrName>
+                                        </p:attrNameLst>
+                                      </p:cBhvr>
+                                      <p:to>
+                                        <p:strVal val="visible"/>
+                                      </p:to>
+                                    </p:set>
+                                  </p:childTnLst>
+                                </p:cTn>
+                              </p:par>
+                            </p:childTnLst>
+                          </p:cTn>
+                        </p:par>
+                      </p:childTnLst>
+                    </p:cTn>
+                  </p:par>
+                  <p:par>
+                    <p:cTn id="19" fill="hold">
+                      <p:stCondLst>
+                        <p:cond delay="indefinite"/>
+                      </p:stCondLst>
+                      <p:childTnLst>
+                        <p:par>
+                          <p:cTn id="20" fill="hold">
+                            <p:stCondLst>
+                              <p:cond delay="0"/>
+                            </p:stCondLst>
+                            <p:childTnLst>
+                              <p:par>
+                                <p:cTn id="21" presetID="1" presetClass="entr" presetSubtype="0" fill="hold" nodeType="clickEffect">
+                                  <p:stCondLst>
+                                    <p:cond delay="0"/>
+                                  </p:stCondLst>
+                                  <p:childTnLst>
+                                    <p:set>
+                                      <p:cBhvr>
+                                        <p:cTn id="22" dur="1" fill="hold">
+                                          <p:stCondLst>
+                                            <p:cond delay="0"/>
+                                          </p:stCondLst>
+                                        </p:cTn>
+                                        <p:tgtEl>
+                                          <p:spTgt spid="5">
+                                            <p:txEl>
+                                              <p:pRg st="8" end="8"/>
+                                            </p:txEl>
+                                          </p:spTgt>
+                                        </p:tgtEl>
+                                        <p:attrNameLst>
+                                          <p:attrName>style.visibility</p:attrName>
+                                        </p:attrNameLst>
+                                      </p:cBhvr>
+                                      <p:to>
+                                        <p:strVal val="visible"/>
+                                      </p:to>
+                                    </p:set>
+                                  </p:childTnLst>
+                                </p:cTn>
+                              </p:par>
+                            </p:childTnLst>
+                          </p:cTn>
+                        </p:par>
+                      </p:childTnLst>
+                    </p:cTn>
+                  </p:par>
+                </p:childTnLst>
+              </p:cTn>
+              <p:prevCondLst>
+                <p:cond evt="onPrev" delay="0">
+                  <p:tgtEl>
+                    <p:sldTgt/>
+                  </p:tgtEl>
+                </p:cond>
+              </p:prevCondLst>
+              <p:nextCondLst>
+                <p:cond evt="onNext" delay="0">
+                  <p:tgtEl>
+                    <p:sldTgt/>
+                  </p:tgtEl>
+                </p:cond>
+              </p:nextCondLst>
+            </p:seq>
+          </p:childTnLst>
+        </p:cTn>
+      </p:par>
+    </p:tnLst>
+  </p:timing>
+</p:sld>
+</file>
+
+<file path=ppt/slides/slide31.xml><?xml version="1.0" encoding="utf-8"?>
+<p:sld xmlns:a="http://schemas.openxmlformats.org/drawingml/2006/main" xmlns:r="http://schemas.openxmlformats.org/officeDocument/2006/relationships" xmlns:p="http://schemas.openxmlformats.org/presentationml/2006/main">
+  <p:cSld>
+    <p:spTree>
+      <p:nvGrpSpPr>
+        <p:cNvPr id="1" name=""/>
+        <p:cNvGrpSpPr/>
+        <p:nvPr/>
+      </p:nvGrpSpPr>
+      <p:grpSpPr>
+        <a:xfrm>
+          <a:off x="0" y="0"/>
+          <a:ext cx="0" cy="0"/>
+          <a:chOff x="0" y="0"/>
+          <a:chExt cx="0" cy="0"/>
+        </a:xfrm>
+      </p:grpSpPr>
+      <p:grpSp>
+        <p:nvGrpSpPr>
+          <p:cNvPr id="13" name="Group 12"/>
+          <p:cNvGrpSpPr/>
+          <p:nvPr/>
+        </p:nvGrpSpPr>
+        <p:grpSpPr>
+          <a:xfrm>
+            <a:off x="2" y="2"/>
+            <a:ext cx="12191999" cy="948335"/>
+            <a:chOff x="0" y="0"/>
+            <a:chExt cx="12192000" cy="948335"/>
+          </a:xfrm>
+          <a:solidFill>
+            <a:schemeClr val="accent1"/>
+          </a:solidFill>
+        </p:grpSpPr>
+        <p:sp>
+          <p:nvSpPr>
+            <p:cNvPr id="2" name="Rectangle 1"/>
+            <p:cNvSpPr/>
+            <p:nvPr/>
+          </p:nvSpPr>
+          <p:spPr>
+            <a:xfrm>
+              <a:off x="0" y="0"/>
+              <a:ext cx="12192000" cy="948335"/>
+            </a:xfrm>
+            <a:prstGeom prst="rect">
+              <a:avLst/>
+            </a:prstGeom>
+            <a:grpFill/>
+            <a:ln>
               <a:noFill/>
             </a:ln>
           </p:spPr>
@@ -29862,7 +31395,7 @@
 </p:sld>
 </file>
 
-<file path=ppt/slides/slide31.xml><?xml version="1.0" encoding="utf-8"?>
+<file path=ppt/slides/slide32.xml><?xml version="1.0" encoding="utf-8"?>
 <p:sld xmlns:a="http://schemas.openxmlformats.org/drawingml/2006/main" xmlns:r="http://schemas.openxmlformats.org/officeDocument/2006/relationships" xmlns:p="http://schemas.openxmlformats.org/presentationml/2006/main">
   <p:cSld>
     <p:spTree>
@@ -30118,7 +31651,7 @@
 </p:sld>
 </file>
 
-<file path=ppt/slides/slide32.xml><?xml version="1.0" encoding="utf-8"?>
+<file path=ppt/slides/slide33.xml><?xml version="1.0" encoding="utf-8"?>
 <p:sld xmlns:a="http://schemas.openxmlformats.org/drawingml/2006/main" xmlns:r="http://schemas.openxmlformats.org/officeDocument/2006/relationships" xmlns:p="http://schemas.openxmlformats.org/presentationml/2006/main">
   <p:cSld>
     <p:spTree>
@@ -30899,7 +32432,7 @@
 </p:sld>
 </file>
 
-<file path=ppt/slides/slide33.xml><?xml version="1.0" encoding="utf-8"?>
+<file path=ppt/slides/slide34.xml><?xml version="1.0" encoding="utf-8"?>
 <p:sld xmlns:a="http://schemas.openxmlformats.org/drawingml/2006/main" xmlns:r="http://schemas.openxmlformats.org/officeDocument/2006/relationships" xmlns:p="http://schemas.openxmlformats.org/presentationml/2006/main">
   <p:cSld>
     <p:spTree>
@@ -31155,7 +32688,7 @@
 </p:sld>
 </file>
 
-<file path=ppt/slides/slide34.xml><?xml version="1.0" encoding="utf-8"?>
+<file path=ppt/slides/slide35.xml><?xml version="1.0" encoding="utf-8"?>
 <p:sld xmlns:a="http://schemas.openxmlformats.org/drawingml/2006/main" xmlns:r="http://schemas.openxmlformats.org/officeDocument/2006/relationships" xmlns:p="http://schemas.openxmlformats.org/presentationml/2006/main">
   <p:cSld>
     <p:spTree>
@@ -31409,7 +32942,7 @@
 </p:sld>
 </file>
 
-<file path=ppt/slides/slide35.xml><?xml version="1.0" encoding="utf-8"?>
+<file path=ppt/slides/slide36.xml><?xml version="1.0" encoding="utf-8"?>
 <p:sld xmlns:a="http://schemas.openxmlformats.org/drawingml/2006/main" xmlns:r="http://schemas.openxmlformats.org/officeDocument/2006/relationships" xmlns:p="http://schemas.openxmlformats.org/presentationml/2006/main">
   <p:cSld>
     <p:spTree>
@@ -31867,7 +33400,7 @@
                     <a:schemeClr val="bg1"/>
                   </a:solidFill>
                 </a:rPr>
-                <a:t>G&amp;GHDD &gt; Big Picture &gt; Centralized vs Decentralized</a:t>
+                <a:t>G&amp;GHDD &gt; Big Picture &gt; Centralized vs Distributed</a:t>
               </a:r>
             </a:p>
           </p:txBody>
@@ -35179,18 +36712,18 @@
 </file>
 
 <file path=customXml/item1.xml><?xml version="1.0" encoding="utf-8"?>
+<p:properties xmlns:p="http://schemas.microsoft.com/office/2006/metadata/properties" xmlns:xsi="http://www.w3.org/2001/XMLSchema-instance" xmlns:pc="http://schemas.microsoft.com/office/infopath/2007/PartnerControls">
+  <documentManagement/>
+</p:properties>
+</file>
+
+<file path=customXml/item2.xml><?xml version="1.0" encoding="utf-8"?>
 <?mso-contentType ?>
 <FormTemplates xmlns="http://schemas.microsoft.com/sharepoint/v3/contenttype/forms">
   <Display>DocumentLibraryForm</Display>
   <Edit>DocumentLibraryForm</Edit>
   <New>DocumentLibraryForm</New>
 </FormTemplates>
-</file>
-
-<file path=customXml/item2.xml><?xml version="1.0" encoding="utf-8"?>
-<p:properties xmlns:p="http://schemas.microsoft.com/office/2006/metadata/properties" xmlns:xsi="http://www.w3.org/2001/XMLSchema-instance" xmlns:pc="http://schemas.microsoft.com/office/infopath/2007/PartnerControls">
-  <documentManagement/>
-</p:properties>
 </file>
 
 <file path=customXml/item3.xml><?xml version="1.0" encoding="utf-8"?>
@@ -35379,18 +36912,18 @@
 </file>
 
 <file path=customXml/itemProps1.xml><?xml version="1.0" encoding="utf-8"?>
-<ds:datastoreItem xmlns:ds="http://schemas.openxmlformats.org/officeDocument/2006/customXml" ds:itemID="{4273EE10-C1B2-449B-9085-39965BA21A56}">
+<ds:datastoreItem xmlns:ds="http://schemas.openxmlformats.org/officeDocument/2006/customXml" ds:itemID="{B61EE2CA-DCC7-45E5-87C8-6789A166AF77}">
   <ds:schemaRefs>
-    <ds:schemaRef ds:uri="http://schemas.microsoft.com/sharepoint/v3/contenttype/forms"/>
+    <ds:schemaRef ds:uri="http://schemas.microsoft.com/office/2006/metadata/properties"/>
+    <ds:schemaRef ds:uri="http://schemas.microsoft.com/office/infopath/2007/PartnerControls"/>
   </ds:schemaRefs>
 </ds:datastoreItem>
 </file>
 
 <file path=customXml/itemProps2.xml><?xml version="1.0" encoding="utf-8"?>
-<ds:datastoreItem xmlns:ds="http://schemas.openxmlformats.org/officeDocument/2006/customXml" ds:itemID="{B61EE2CA-DCC7-45E5-87C8-6789A166AF77}">
+<ds:datastoreItem xmlns:ds="http://schemas.openxmlformats.org/officeDocument/2006/customXml" ds:itemID="{4273EE10-C1B2-449B-9085-39965BA21A56}">
   <ds:schemaRefs>
-    <ds:schemaRef ds:uri="http://schemas.microsoft.com/office/2006/metadata/properties"/>
-    <ds:schemaRef ds:uri="http://schemas.microsoft.com/office/infopath/2007/PartnerControls"/>
+    <ds:schemaRef ds:uri="http://schemas.microsoft.com/sharepoint/v3/contenttype/forms"/>
   </ds:schemaRefs>
 </ds:datastoreItem>
 </file>

</xml_diff>

<commit_message>
Streamlining katas across workshops
</commit_message>
<xml_diff>
--- a/workshops/git-github-deep-dive/git_github_deep_dive.pptx
+++ b/workshops/git-github-deep-dive/git_github_deep_dive.pptx
@@ -2957,7 +2957,7 @@
           <a:p>
             <a:fld id="{F540F470-726F-426E-889A-8E92A4693460}" type="datetimeFigureOut">
               <a:rPr lang="en-GB" smtClean="0"/>
-              <a:t>08/10/2020</a:t>
+              <a:t>09/10/2020</a:t>
             </a:fld>
             <a:endParaRPr lang="en-GB" dirty="0"/>
           </a:p>
@@ -3127,7 +3127,7 @@
             <a:fld id="{CD72A38B-F9FA-4036-A084-652409E98F08}" type="datetimeFigureOut">
               <a:rPr lang="en-GB" smtClean="0"/>
               <a:pPr/>
-              <a:t>08/10/2020</a:t>
+              <a:t>09/10/2020</a:t>
             </a:fld>
             <a:endParaRPr lang="en-GB" dirty="0"/>
           </a:p>
@@ -5464,10 +5464,6 @@
           <a:bodyPr/>
           <a:lstStyle/>
           <a:p>
-            <a:r>
-              <a:rPr lang="en-US" dirty="0"/>
-              <a:t>https://docs.github.com/en/free-pro-team@latest/github/managing-files-in-a-repository</a:t>
-            </a:r>
             <a:endParaRPr lang="da-DK" dirty="0"/>
           </a:p>
         </p:txBody>
@@ -6578,7 +6574,7 @@
           <a:p>
             <a:fld id="{CAE15A36-EF7C-49E1-9E28-DC0261021B88}" type="datetime4">
               <a:rPr lang="en-GB" smtClean="0"/>
-              <a:t>08 October 2020</a:t>
+              <a:t>09 October 2020</a:t>
             </a:fld>
             <a:endParaRPr lang="en-GB" dirty="0"/>
           </a:p>
@@ -7081,7 +7077,7 @@
           <a:p>
             <a:fld id="{73A80043-8D1A-4EE7-8835-0FA45918CF0B}" type="datetime4">
               <a:rPr lang="en-GB" smtClean="0"/>
-              <a:t>08 October 2020</a:t>
+              <a:t>09 October 2020</a:t>
             </a:fld>
             <a:endParaRPr lang="en-GB" dirty="0"/>
           </a:p>
@@ -15607,7 +15603,7 @@
           <a:p>
             <a:fld id="{61C39D88-A2D2-46EF-88AA-9A0C8DF2E827}" type="datetime4">
               <a:rPr lang="en-GB" smtClean="0"/>
-              <a:t>08 October 2020</a:t>
+              <a:t>09 October 2020</a:t>
             </a:fld>
             <a:endParaRPr lang="en-GB" dirty="0"/>
           </a:p>
@@ -16994,7 +16990,7 @@
           <a:p>
             <a:fld id="{E66F39FE-A71C-4EA9-B6A2-49D418A61827}" type="datetimeFigureOut">
               <a:rPr lang="en-US" smtClean="0"/>
-              <a:t>10/8/2020</a:t>
+              <a:t>10/9/2020</a:t>
             </a:fld>
             <a:endParaRPr lang="en-US"/>
           </a:p>
@@ -20775,7 +20771,7 @@
           <a:p>
             <a:fld id="{A98DB34D-784C-4D9C-ABD8-61F63F762187}" type="datetime4">
               <a:rPr lang="en-GB" smtClean="0"/>
-              <a:t>08 October 2020</a:t>
+              <a:t>09 October 2020</a:t>
             </a:fld>
             <a:endParaRPr lang="en-GB" dirty="0"/>
           </a:p>
@@ -36712,18 +36708,18 @@
 </file>
 
 <file path=customXml/item1.xml><?xml version="1.0" encoding="utf-8"?>
-<p:properties xmlns:p="http://schemas.microsoft.com/office/2006/metadata/properties" xmlns:xsi="http://www.w3.org/2001/XMLSchema-instance" xmlns:pc="http://schemas.microsoft.com/office/infopath/2007/PartnerControls">
-  <documentManagement/>
-</p:properties>
-</file>
-
-<file path=customXml/item2.xml><?xml version="1.0" encoding="utf-8"?>
 <?mso-contentType ?>
 <FormTemplates xmlns="http://schemas.microsoft.com/sharepoint/v3/contenttype/forms">
   <Display>DocumentLibraryForm</Display>
   <Edit>DocumentLibraryForm</Edit>
   <New>DocumentLibraryForm</New>
 </FormTemplates>
+</file>
+
+<file path=customXml/item2.xml><?xml version="1.0" encoding="utf-8"?>
+<p:properties xmlns:p="http://schemas.microsoft.com/office/2006/metadata/properties" xmlns:xsi="http://www.w3.org/2001/XMLSchema-instance" xmlns:pc="http://schemas.microsoft.com/office/infopath/2007/PartnerControls">
+  <documentManagement/>
+</p:properties>
 </file>
 
 <file path=customXml/item3.xml><?xml version="1.0" encoding="utf-8"?>
@@ -36912,18 +36908,18 @@
 </file>
 
 <file path=customXml/itemProps1.xml><?xml version="1.0" encoding="utf-8"?>
-<ds:datastoreItem xmlns:ds="http://schemas.openxmlformats.org/officeDocument/2006/customXml" ds:itemID="{B61EE2CA-DCC7-45E5-87C8-6789A166AF77}">
+<ds:datastoreItem xmlns:ds="http://schemas.openxmlformats.org/officeDocument/2006/customXml" ds:itemID="{4273EE10-C1B2-449B-9085-39965BA21A56}">
   <ds:schemaRefs>
-    <ds:schemaRef ds:uri="http://schemas.microsoft.com/office/2006/metadata/properties"/>
-    <ds:schemaRef ds:uri="http://schemas.microsoft.com/office/infopath/2007/PartnerControls"/>
+    <ds:schemaRef ds:uri="http://schemas.microsoft.com/sharepoint/v3/contenttype/forms"/>
   </ds:schemaRefs>
 </ds:datastoreItem>
 </file>
 
 <file path=customXml/itemProps2.xml><?xml version="1.0" encoding="utf-8"?>
-<ds:datastoreItem xmlns:ds="http://schemas.openxmlformats.org/officeDocument/2006/customXml" ds:itemID="{4273EE10-C1B2-449B-9085-39965BA21A56}">
+<ds:datastoreItem xmlns:ds="http://schemas.openxmlformats.org/officeDocument/2006/customXml" ds:itemID="{B61EE2CA-DCC7-45E5-87C8-6789A166AF77}">
   <ds:schemaRefs>
-    <ds:schemaRef ds:uri="http://schemas.microsoft.com/sharepoint/v3/contenttype/forms"/>
+    <ds:schemaRef ds:uri="http://schemas.microsoft.com/office/2006/metadata/properties"/>
+    <ds:schemaRef ds:uri="http://schemas.microsoft.com/office/infopath/2007/PartnerControls"/>
   </ds:schemaRefs>
 </ds:datastoreItem>
 </file>

</xml_diff>

<commit_message>
added merge step to kata 4
</commit_message>
<xml_diff>
--- a/workshops/git-github-deep-dive/git_github_deep_dive.pptx
+++ b/workshops/git-github-deep-dive/git_github_deep_dive.pptx
@@ -3647,10 +3647,6 @@
               <a:tabLst/>
               <a:defRPr/>
             </a:pPr>
-            <a:r>
-              <a:rPr lang="en-US" sz="1200" dirty="0"/>
-              <a:t>https://git-scm.com/book/en/v2/Git-Branching-Basic-Branching-and-Merging</a:t>
-            </a:r>
             <a:endParaRPr lang="da-DK" dirty="0"/>
           </a:p>
         </p:txBody>
@@ -36708,18 +36704,18 @@
 </file>
 
 <file path=customXml/item1.xml><?xml version="1.0" encoding="utf-8"?>
+<p:properties xmlns:p="http://schemas.microsoft.com/office/2006/metadata/properties" xmlns:xsi="http://www.w3.org/2001/XMLSchema-instance" xmlns:pc="http://schemas.microsoft.com/office/infopath/2007/PartnerControls">
+  <documentManagement/>
+</p:properties>
+</file>
+
+<file path=customXml/item2.xml><?xml version="1.0" encoding="utf-8"?>
 <?mso-contentType ?>
 <FormTemplates xmlns="http://schemas.microsoft.com/sharepoint/v3/contenttype/forms">
   <Display>DocumentLibraryForm</Display>
   <Edit>DocumentLibraryForm</Edit>
   <New>DocumentLibraryForm</New>
 </FormTemplates>
-</file>
-
-<file path=customXml/item2.xml><?xml version="1.0" encoding="utf-8"?>
-<p:properties xmlns:p="http://schemas.microsoft.com/office/2006/metadata/properties" xmlns:xsi="http://www.w3.org/2001/XMLSchema-instance" xmlns:pc="http://schemas.microsoft.com/office/infopath/2007/PartnerControls">
-  <documentManagement/>
-</p:properties>
 </file>
 
 <file path=customXml/item3.xml><?xml version="1.0" encoding="utf-8"?>
@@ -36908,18 +36904,18 @@
 </file>
 
 <file path=customXml/itemProps1.xml><?xml version="1.0" encoding="utf-8"?>
-<ds:datastoreItem xmlns:ds="http://schemas.openxmlformats.org/officeDocument/2006/customXml" ds:itemID="{4273EE10-C1B2-449B-9085-39965BA21A56}">
+<ds:datastoreItem xmlns:ds="http://schemas.openxmlformats.org/officeDocument/2006/customXml" ds:itemID="{B61EE2CA-DCC7-45E5-87C8-6789A166AF77}">
   <ds:schemaRefs>
-    <ds:schemaRef ds:uri="http://schemas.microsoft.com/sharepoint/v3/contenttype/forms"/>
+    <ds:schemaRef ds:uri="http://schemas.microsoft.com/office/2006/metadata/properties"/>
+    <ds:schemaRef ds:uri="http://schemas.microsoft.com/office/infopath/2007/PartnerControls"/>
   </ds:schemaRefs>
 </ds:datastoreItem>
 </file>
 
 <file path=customXml/itemProps2.xml><?xml version="1.0" encoding="utf-8"?>
-<ds:datastoreItem xmlns:ds="http://schemas.openxmlformats.org/officeDocument/2006/customXml" ds:itemID="{B61EE2CA-DCC7-45E5-87C8-6789A166AF77}">
+<ds:datastoreItem xmlns:ds="http://schemas.openxmlformats.org/officeDocument/2006/customXml" ds:itemID="{4273EE10-C1B2-449B-9085-39965BA21A56}">
   <ds:schemaRefs>
-    <ds:schemaRef ds:uri="http://schemas.microsoft.com/office/2006/metadata/properties"/>
-    <ds:schemaRef ds:uri="http://schemas.microsoft.com/office/infopath/2007/PartnerControls"/>
+    <ds:schemaRef ds:uri="http://schemas.microsoft.com/sharepoint/v3/contenttype/forms"/>
   </ds:schemaRefs>
 </ds:datastoreItem>
 </file>

</xml_diff>